<commit_message>
update FB -> META
</commit_message>
<xml_diff>
--- a/003_powerpoint_slidedeck/stock_report.pptx
+++ b/003_powerpoint_slidedeck/stock_report.pptx
@@ -4,7 +4,7 @@
   <p:sldMasterIdLst>
     <p:sldMasterId id="2147483648" r:id="rId1"/>
   </p:sldMasterIdLst>
-  <p:sldIdLst xmlns:a="http://schemas.openxmlformats.org/drawingml/2006/main" xmlns:r="http://schemas.openxmlformats.org/officeDocument/2006/relationships" xmlns:p="http://schemas.openxmlformats.org/presentationml/2006/main">
+  <p:sldIdLst>
     <p:sldId id="256" r:id="rId8"/>
   </p:sldIdLst>
   <p:sldSz cx="9144000" cy="6858000" type="screen4x3"/>
@@ -2214,7 +2214,7 @@
           <a:chExt cx="0" cy="0"/>
         </a:xfrm>
       </p:grpSpPr>
-      <p:sp xmlns:a="http://schemas.openxmlformats.org/drawingml/2006/main" xmlns:r="http://schemas.openxmlformats.org/officeDocument/2006/relationships" xmlns:p="http://schemas.openxmlformats.org/presentationml/2006/main">
+      <p:sp>
         <p:nvSpPr>
           <p:cNvPr id="2" name="Title 1"/>
           <p:cNvSpPr>
@@ -2241,7 +2241,7 @@
           </a:p>
         </p:txBody>
       </p:sp>
-      <p:graphicFrame xmlns:a="http://schemas.openxmlformats.org/drawingml/2006/main" xmlns:r="http://schemas.openxmlformats.org/officeDocument/2006/relationships" xmlns:p="http://schemas.openxmlformats.org/presentationml/2006/main">
+      <p:graphicFrame>
         <p:nvGraphicFramePr>
           <p:cNvPr id="3" name="Content Placeholder 2"/>
           <p:cNvGraphicFramePr>
@@ -2276,60 +2276,59 @@
                           <a:spcPct val="100000"/>
                         </a:lnSpc>
                         <a:spcBef>
-                          <a:spcPts val="200"/>
+                          <a:spcPts val="500"/>
                         </a:spcBef>
                         <a:spcAft>
-                          <a:spcPts val="200"/>
+                          <a:spcPts val="500"/>
                         </a:spcAft>
                         <a:buNone/>
                       </a:pPr>
                       <a:r>
-                        <a:rPr sz="1100">
+                        <a:rPr cap="none" sz="1100" i="0" b="0" u="none">
                           <a:solidFill>
-                            <a:srgbClr val="111111">
+                            <a:srgbClr val="000000">
                               <a:alpha val="100000"/>
                             </a:srgbClr>
                           </a:solidFill>
-                          <a:latin typeface="Roboto"/>
-                          <a:cs typeface="Roboto"/>
+                          <a:latin typeface="Helvetica"/>
+                          <a:cs typeface="Helvetica"/>
+                          <a:ea typeface="Helvetica"/>
+                          <a:sym typeface="Helvetica"/>
                         </a:rPr>
                         <a:t>Symbol</a:t>
                       </a:r>
                     </a:p>
                   </a:txBody>
-                  <a:tcPr anchor="ctr" marB="0" marT="0" marR="0" marL="0">
-                    <a:lnL w="0" cmpd="sng" algn="ctr" cap="flat">
+                  <a:tcPr anchor="ctr" marB="63500" marT="63500" marR="0" marL="0">
+                    <a:lnL algn="ctr" cmpd="sng" cap="flat" w="0">
+                      <a:noFill/>
+                      <a:prstDash val="solid"/>
+                    </a:lnL>
+                    <a:lnR algn="ctr" cmpd="sng" cap="flat" w="0">
+                      <a:noFill/>
+                      <a:prstDash val="solid"/>
+                    </a:lnR>
+                    <a:lnT algn="ctr" cmpd="sng" cap="flat" w="19050">
                       <a:solidFill>
-                        <a:srgbClr val="FFFFFF">
-                          <a:alpha val="0"/>
-                        </a:srgbClr>
-                      </a:solidFill>
-                      <a:prstDash val="solid"/>
-                    </a:lnL>
-                    <a:lnR w="0" cmpd="sng" algn="ctr" cap="flat">
-                      <a:solidFill>
-                        <a:srgbClr val="FFFFFF">
-                          <a:alpha val="0"/>
-                        </a:srgbClr>
-                      </a:solidFill>
-                      <a:prstDash val="solid"/>
-                    </a:lnR>
-                    <a:lnT w="25400" cmpd="sng" algn="ctr" cap="flat">
-                      <a:solidFill>
-                        <a:srgbClr val="000000">
+                        <a:srgbClr val="666666">
                           <a:alpha val="100000"/>
                         </a:srgbClr>
                       </a:solidFill>
                       <a:prstDash val="solid"/>
                     </a:lnT>
-                    <a:lnB w="25400" cmpd="sng" algn="ctr" cap="flat">
+                    <a:lnB algn="ctr" cmpd="sng" cap="flat" w="19050">
                       <a:solidFill>
-                        <a:srgbClr val="000000">
+                        <a:srgbClr val="666666">
                           <a:alpha val="100000"/>
                         </a:srgbClr>
                       </a:solidFill>
                       <a:prstDash val="solid"/>
                     </a:lnB>
+                    <a:solidFill>
+                      <a:srgbClr val="FFFFFF">
+                        <a:alpha val="0"/>
+                      </a:srgbClr>
+                    </a:solidFill>
                   </a:tcPr>
                 </a:tc>
                 <a:tc>
@@ -2342,60 +2341,59 @@
                           <a:spcPct val="100000"/>
                         </a:lnSpc>
                         <a:spcBef>
-                          <a:spcPts val="200"/>
+                          <a:spcPts val="500"/>
                         </a:spcBef>
                         <a:spcAft>
-                          <a:spcPts val="200"/>
+                          <a:spcPts val="500"/>
                         </a:spcAft>
                         <a:buNone/>
                       </a:pPr>
                       <a:r>
-                        <a:rPr sz="1100">
+                        <a:rPr cap="none" sz="1100" i="0" b="0" u="none">
                           <a:solidFill>
-                            <a:srgbClr val="111111">
+                            <a:srgbClr val="000000">
                               <a:alpha val="100000"/>
                             </a:srgbClr>
                           </a:solidFill>
-                          <a:latin typeface="Roboto"/>
-                          <a:cs typeface="Roboto"/>
+                          <a:latin typeface="Helvetica"/>
+                          <a:cs typeface="Helvetica"/>
+                          <a:ea typeface="Helvetica"/>
+                          <a:sym typeface="Helvetica"/>
                         </a:rPr>
                         <a:t>Week</a:t>
                       </a:r>
                     </a:p>
                   </a:txBody>
-                  <a:tcPr anchor="ctr" marB="0" marT="0" marR="0" marL="0">
-                    <a:lnL w="0" cmpd="sng" algn="ctr" cap="flat">
+                  <a:tcPr anchor="ctr" marB="63500" marT="63500" marR="0" marL="0">
+                    <a:lnL algn="ctr" cmpd="sng" cap="flat" w="0">
+                      <a:noFill/>
+                      <a:prstDash val="solid"/>
+                    </a:lnL>
+                    <a:lnR algn="ctr" cmpd="sng" cap="flat" w="0">
+                      <a:noFill/>
+                      <a:prstDash val="solid"/>
+                    </a:lnR>
+                    <a:lnT algn="ctr" cmpd="sng" cap="flat" w="19050">
                       <a:solidFill>
-                        <a:srgbClr val="FFFFFF">
-                          <a:alpha val="0"/>
-                        </a:srgbClr>
-                      </a:solidFill>
-                      <a:prstDash val="solid"/>
-                    </a:lnL>
-                    <a:lnR w="0" cmpd="sng" algn="ctr" cap="flat">
-                      <a:solidFill>
-                        <a:srgbClr val="FFFFFF">
-                          <a:alpha val="0"/>
-                        </a:srgbClr>
-                      </a:solidFill>
-                      <a:prstDash val="solid"/>
-                    </a:lnR>
-                    <a:lnT w="25400" cmpd="sng" algn="ctr" cap="flat">
-                      <a:solidFill>
-                        <a:srgbClr val="000000">
+                        <a:srgbClr val="666666">
                           <a:alpha val="100000"/>
                         </a:srgbClr>
                       </a:solidFill>
                       <a:prstDash val="solid"/>
                     </a:lnT>
-                    <a:lnB w="25400" cmpd="sng" algn="ctr" cap="flat">
+                    <a:lnB algn="ctr" cmpd="sng" cap="flat" w="19050">
                       <a:solidFill>
-                        <a:srgbClr val="000000">
+                        <a:srgbClr val="666666">
                           <a:alpha val="100000"/>
                         </a:srgbClr>
                       </a:solidFill>
                       <a:prstDash val="solid"/>
                     </a:lnB>
+                    <a:solidFill>
+                      <a:srgbClr val="FFFFFF">
+                        <a:alpha val="0"/>
+                      </a:srgbClr>
+                    </a:solidFill>
                   </a:tcPr>
                 </a:tc>
                 <a:tc>
@@ -2408,60 +2406,59 @@
                           <a:spcPct val="100000"/>
                         </a:lnSpc>
                         <a:spcBef>
-                          <a:spcPts val="200"/>
+                          <a:spcPts val="500"/>
                         </a:spcBef>
                         <a:spcAft>
-                          <a:spcPts val="200"/>
+                          <a:spcPts val="500"/>
                         </a:spcAft>
                         <a:buNone/>
                       </a:pPr>
                       <a:r>
-                        <a:rPr sz="1100">
+                        <a:rPr cap="none" sz="1100" i="0" b="0" u="none">
                           <a:solidFill>
-                            <a:srgbClr val="111111">
+                            <a:srgbClr val="000000">
                               <a:alpha val="100000"/>
                             </a:srgbClr>
                           </a:solidFill>
-                          <a:latin typeface="Roboto"/>
-                          <a:cs typeface="Roboto"/>
+                          <a:latin typeface="Helvetica"/>
+                          <a:cs typeface="Helvetica"/>
+                          <a:ea typeface="Helvetica"/>
+                          <a:sym typeface="Helvetica"/>
                         </a:rPr>
                         <a:t>Month</a:t>
                       </a:r>
                     </a:p>
                   </a:txBody>
-                  <a:tcPr anchor="ctr" marB="0" marT="0" marR="0" marL="0">
-                    <a:lnL w="0" cmpd="sng" algn="ctr" cap="flat">
+                  <a:tcPr anchor="ctr" marB="63500" marT="63500" marR="0" marL="0">
+                    <a:lnL algn="ctr" cmpd="sng" cap="flat" w="0">
+                      <a:noFill/>
+                      <a:prstDash val="solid"/>
+                    </a:lnL>
+                    <a:lnR algn="ctr" cmpd="sng" cap="flat" w="0">
+                      <a:noFill/>
+                      <a:prstDash val="solid"/>
+                    </a:lnR>
+                    <a:lnT algn="ctr" cmpd="sng" cap="flat" w="19050">
                       <a:solidFill>
-                        <a:srgbClr val="FFFFFF">
-                          <a:alpha val="0"/>
-                        </a:srgbClr>
-                      </a:solidFill>
-                      <a:prstDash val="solid"/>
-                    </a:lnL>
-                    <a:lnR w="0" cmpd="sng" algn="ctr" cap="flat">
-                      <a:solidFill>
-                        <a:srgbClr val="FFFFFF">
-                          <a:alpha val="0"/>
-                        </a:srgbClr>
-                      </a:solidFill>
-                      <a:prstDash val="solid"/>
-                    </a:lnR>
-                    <a:lnT w="25400" cmpd="sng" algn="ctr" cap="flat">
-                      <a:solidFill>
-                        <a:srgbClr val="000000">
+                        <a:srgbClr val="666666">
                           <a:alpha val="100000"/>
                         </a:srgbClr>
                       </a:solidFill>
                       <a:prstDash val="solid"/>
                     </a:lnT>
-                    <a:lnB w="25400" cmpd="sng" algn="ctr" cap="flat">
+                    <a:lnB algn="ctr" cmpd="sng" cap="flat" w="19050">
                       <a:solidFill>
-                        <a:srgbClr val="000000">
+                        <a:srgbClr val="666666">
                           <a:alpha val="100000"/>
                         </a:srgbClr>
                       </a:solidFill>
                       <a:prstDash val="solid"/>
                     </a:lnB>
+                    <a:solidFill>
+                      <a:srgbClr val="FFFFFF">
+                        <a:alpha val="0"/>
+                      </a:srgbClr>
+                    </a:solidFill>
                   </a:tcPr>
                 </a:tc>
                 <a:tc>
@@ -2474,60 +2471,59 @@
                           <a:spcPct val="100000"/>
                         </a:lnSpc>
                         <a:spcBef>
-                          <a:spcPts val="200"/>
+                          <a:spcPts val="500"/>
                         </a:spcBef>
                         <a:spcAft>
-                          <a:spcPts val="200"/>
+                          <a:spcPts val="500"/>
                         </a:spcAft>
                         <a:buNone/>
                       </a:pPr>
                       <a:r>
-                        <a:rPr sz="1100">
+                        <a:rPr cap="none" sz="1100" i="0" b="0" u="none">
                           <a:solidFill>
-                            <a:srgbClr val="111111">
+                            <a:srgbClr val="000000">
                               <a:alpha val="100000"/>
                             </a:srgbClr>
                           </a:solidFill>
-                          <a:latin typeface="Roboto"/>
-                          <a:cs typeface="Roboto"/>
+                          <a:latin typeface="Helvetica"/>
+                          <a:cs typeface="Helvetica"/>
+                          <a:ea typeface="Helvetica"/>
+                          <a:sym typeface="Helvetica"/>
                         </a:rPr>
                         <a:t>Quarter</a:t>
                       </a:r>
                     </a:p>
                   </a:txBody>
-                  <a:tcPr anchor="ctr" marB="0" marT="0" marR="0" marL="0">
-                    <a:lnL w="0" cmpd="sng" algn="ctr" cap="flat">
+                  <a:tcPr anchor="ctr" marB="63500" marT="63500" marR="0" marL="0">
+                    <a:lnL algn="ctr" cmpd="sng" cap="flat" w="0">
+                      <a:noFill/>
+                      <a:prstDash val="solid"/>
+                    </a:lnL>
+                    <a:lnR algn="ctr" cmpd="sng" cap="flat" w="0">
+                      <a:noFill/>
+                      <a:prstDash val="solid"/>
+                    </a:lnR>
+                    <a:lnT algn="ctr" cmpd="sng" cap="flat" w="19050">
                       <a:solidFill>
-                        <a:srgbClr val="FFFFFF">
-                          <a:alpha val="0"/>
-                        </a:srgbClr>
-                      </a:solidFill>
-                      <a:prstDash val="solid"/>
-                    </a:lnL>
-                    <a:lnR w="0" cmpd="sng" algn="ctr" cap="flat">
-                      <a:solidFill>
-                        <a:srgbClr val="FFFFFF">
-                          <a:alpha val="0"/>
-                        </a:srgbClr>
-                      </a:solidFill>
-                      <a:prstDash val="solid"/>
-                    </a:lnR>
-                    <a:lnT w="25400" cmpd="sng" algn="ctr" cap="flat">
-                      <a:solidFill>
-                        <a:srgbClr val="000000">
+                        <a:srgbClr val="666666">
                           <a:alpha val="100000"/>
                         </a:srgbClr>
                       </a:solidFill>
                       <a:prstDash val="solid"/>
                     </a:lnT>
-                    <a:lnB w="25400" cmpd="sng" algn="ctr" cap="flat">
+                    <a:lnB algn="ctr" cmpd="sng" cap="flat" w="19050">
                       <a:solidFill>
-                        <a:srgbClr val="000000">
+                        <a:srgbClr val="666666">
                           <a:alpha val="100000"/>
                         </a:srgbClr>
                       </a:solidFill>
                       <a:prstDash val="solid"/>
                     </a:lnB>
+                    <a:solidFill>
+                      <a:srgbClr val="FFFFFF">
+                        <a:alpha val="0"/>
+                      </a:srgbClr>
+                    </a:solidFill>
                   </a:tcPr>
                 </a:tc>
                 <a:tc>
@@ -2540,60 +2536,59 @@
                           <a:spcPct val="100000"/>
                         </a:lnSpc>
                         <a:spcBef>
-                          <a:spcPts val="200"/>
+                          <a:spcPts val="500"/>
                         </a:spcBef>
                         <a:spcAft>
-                          <a:spcPts val="200"/>
+                          <a:spcPts val="500"/>
                         </a:spcAft>
                         <a:buNone/>
                       </a:pPr>
                       <a:r>
-                        <a:rPr sz="1100">
+                        <a:rPr cap="none" sz="1100" i="0" b="0" u="none">
                           <a:solidFill>
-                            <a:srgbClr val="111111">
+                            <a:srgbClr val="000000">
                               <a:alpha val="100000"/>
                             </a:srgbClr>
                           </a:solidFill>
-                          <a:latin typeface="Roboto"/>
-                          <a:cs typeface="Roboto"/>
+                          <a:latin typeface="Helvetica"/>
+                          <a:cs typeface="Helvetica"/>
+                          <a:ea typeface="Helvetica"/>
+                          <a:sym typeface="Helvetica"/>
                         </a:rPr>
                         <a:t>Year</a:t>
                       </a:r>
                     </a:p>
                   </a:txBody>
-                  <a:tcPr anchor="ctr" marB="0" marT="0" marR="0" marL="0">
-                    <a:lnL w="0" cmpd="sng" algn="ctr" cap="flat">
+                  <a:tcPr anchor="ctr" marB="63500" marT="63500" marR="0" marL="0">
+                    <a:lnL algn="ctr" cmpd="sng" cap="flat" w="0">
+                      <a:noFill/>
+                      <a:prstDash val="solid"/>
+                    </a:lnL>
+                    <a:lnR algn="ctr" cmpd="sng" cap="flat" w="0">
+                      <a:noFill/>
+                      <a:prstDash val="solid"/>
+                    </a:lnR>
+                    <a:lnT algn="ctr" cmpd="sng" cap="flat" w="19050">
                       <a:solidFill>
-                        <a:srgbClr val="FFFFFF">
-                          <a:alpha val="0"/>
-                        </a:srgbClr>
-                      </a:solidFill>
-                      <a:prstDash val="solid"/>
-                    </a:lnL>
-                    <a:lnR w="0" cmpd="sng" algn="ctr" cap="flat">
-                      <a:solidFill>
-                        <a:srgbClr val="FFFFFF">
-                          <a:alpha val="0"/>
-                        </a:srgbClr>
-                      </a:solidFill>
-                      <a:prstDash val="solid"/>
-                    </a:lnR>
-                    <a:lnT w="25400" cmpd="sng" algn="ctr" cap="flat">
-                      <a:solidFill>
-                        <a:srgbClr val="000000">
+                        <a:srgbClr val="666666">
                           <a:alpha val="100000"/>
                         </a:srgbClr>
                       </a:solidFill>
                       <a:prstDash val="solid"/>
                     </a:lnT>
-                    <a:lnB w="25400" cmpd="sng" algn="ctr" cap="flat">
+                    <a:lnB algn="ctr" cmpd="sng" cap="flat" w="19050">
                       <a:solidFill>
-                        <a:srgbClr val="000000">
+                        <a:srgbClr val="666666">
                           <a:alpha val="100000"/>
                         </a:srgbClr>
                       </a:solidFill>
                       <a:prstDash val="solid"/>
                     </a:lnB>
+                    <a:solidFill>
+                      <a:srgbClr val="FFFFFF">
+                        <a:alpha val="0"/>
+                      </a:srgbClr>
+                    </a:solidFill>
                   </a:tcPr>
                 </a:tc>
                 <a:tc>
@@ -2606,60 +2601,59 @@
                           <a:spcPct val="100000"/>
                         </a:lnSpc>
                         <a:spcBef>
-                          <a:spcPts val="200"/>
+                          <a:spcPts val="500"/>
                         </a:spcBef>
                         <a:spcAft>
-                          <a:spcPts val="200"/>
+                          <a:spcPts val="500"/>
                         </a:spcAft>
                         <a:buNone/>
                       </a:pPr>
                       <a:r>
-                        <a:rPr sz="1100">
+                        <a:rPr cap="none" sz="1100" i="0" b="0" u="none">
                           <a:solidFill>
-                            <a:srgbClr val="111111">
+                            <a:srgbClr val="000000">
                               <a:alpha val="100000"/>
                             </a:srgbClr>
                           </a:solidFill>
-                          <a:latin typeface="Roboto"/>
-                          <a:cs typeface="Roboto"/>
+                          <a:latin typeface="Helvetica"/>
+                          <a:cs typeface="Helvetica"/>
+                          <a:ea typeface="Helvetica"/>
+                          <a:sym typeface="Helvetica"/>
                         </a:rPr>
                         <a:t>All</a:t>
                       </a:r>
                     </a:p>
                   </a:txBody>
-                  <a:tcPr anchor="ctr" marB="0" marT="0" marR="0" marL="0">
-                    <a:lnL w="0" cmpd="sng" algn="ctr" cap="flat">
+                  <a:tcPr anchor="ctr" marB="63500" marT="63500" marR="0" marL="0">
+                    <a:lnL algn="ctr" cmpd="sng" cap="flat" w="0">
+                      <a:noFill/>
+                      <a:prstDash val="solid"/>
+                    </a:lnL>
+                    <a:lnR algn="ctr" cmpd="sng" cap="flat" w="0">
+                      <a:noFill/>
+                      <a:prstDash val="solid"/>
+                    </a:lnR>
+                    <a:lnT algn="ctr" cmpd="sng" cap="flat" w="19050">
                       <a:solidFill>
-                        <a:srgbClr val="FFFFFF">
-                          <a:alpha val="0"/>
-                        </a:srgbClr>
-                      </a:solidFill>
-                      <a:prstDash val="solid"/>
-                    </a:lnL>
-                    <a:lnR w="0" cmpd="sng" algn="ctr" cap="flat">
-                      <a:solidFill>
-                        <a:srgbClr val="FFFFFF">
-                          <a:alpha val="0"/>
-                        </a:srgbClr>
-                      </a:solidFill>
-                      <a:prstDash val="solid"/>
-                    </a:lnR>
-                    <a:lnT w="25400" cmpd="sng" algn="ctr" cap="flat">
-                      <a:solidFill>
-                        <a:srgbClr val="000000">
+                        <a:srgbClr val="666666">
                           <a:alpha val="100000"/>
                         </a:srgbClr>
                       </a:solidFill>
                       <a:prstDash val="solid"/>
                     </a:lnT>
-                    <a:lnB w="25400" cmpd="sng" algn="ctr" cap="flat">
+                    <a:lnB algn="ctr" cmpd="sng" cap="flat" w="19050">
                       <a:solidFill>
-                        <a:srgbClr val="000000">
+                        <a:srgbClr val="666666">
                           <a:alpha val="100000"/>
                         </a:srgbClr>
                       </a:solidFill>
                       <a:prstDash val="solid"/>
                     </a:lnB>
+                    <a:solidFill>
+                      <a:srgbClr val="FFFFFF">
+                        <a:alpha val="0"/>
+                      </a:srgbClr>
+                    </a:solidFill>
                   </a:tcPr>
                 </a:tc>
               </a:tr>
@@ -2674,60 +2668,51 @@
                           <a:spcPct val="100000"/>
                         </a:lnSpc>
                         <a:spcBef>
-                          <a:spcPts val="200"/>
+                          <a:spcPts val="500"/>
                         </a:spcBef>
                         <a:spcAft>
-                          <a:spcPts val="200"/>
+                          <a:spcPts val="500"/>
                         </a:spcAft>
                         <a:buNone/>
                       </a:pPr>
                       <a:r>
-                        <a:rPr sz="1100">
+                        <a:rPr cap="none" sz="1100" i="0" b="0" u="none">
                           <a:solidFill>
-                            <a:srgbClr val="111111">
+                            <a:srgbClr val="000000">
                               <a:alpha val="100000"/>
                             </a:srgbClr>
                           </a:solidFill>
-                          <a:latin typeface="Roboto"/>
-                          <a:cs typeface="Roboto"/>
+                          <a:latin typeface="Helvetica"/>
+                          <a:cs typeface="Helvetica"/>
+                          <a:ea typeface="Helvetica"/>
+                          <a:sym typeface="Helvetica"/>
                         </a:rPr>
                         <a:t>AAPL</a:t>
                       </a:r>
                     </a:p>
                   </a:txBody>
-                  <a:tcPr anchor="ctr" marB="0" marT="0" marR="0" marL="0">
-                    <a:lnL w="0" cmpd="sng" algn="ctr" cap="flat">
-                      <a:solidFill>
-                        <a:srgbClr val="FFFFFF">
-                          <a:alpha val="0"/>
-                        </a:srgbClr>
-                      </a:solidFill>
+                  <a:tcPr anchor="ctr" marB="63500" marT="63500" marR="0" marL="0">
+                    <a:lnL algn="ctr" cmpd="sng" cap="flat" w="0">
+                      <a:noFill/>
                       <a:prstDash val="solid"/>
                     </a:lnL>
-                    <a:lnR w="0" cmpd="sng" algn="ctr" cap="flat">
-                      <a:solidFill>
-                        <a:srgbClr val="FFFFFF">
-                          <a:alpha val="0"/>
-                        </a:srgbClr>
-                      </a:solidFill>
+                    <a:lnR algn="ctr" cmpd="sng" cap="flat" w="0">
+                      <a:noFill/>
                       <a:prstDash val="solid"/>
                     </a:lnR>
-                    <a:lnT w="0" cmpd="sng" algn="ctr" cap="flat">
-                      <a:solidFill>
-                        <a:srgbClr val="FFFFFF">
-                          <a:alpha val="0"/>
-                        </a:srgbClr>
-                      </a:solidFill>
+                    <a:lnT algn="ctr" cmpd="sng" cap="flat" w="0">
+                      <a:noFill/>
                       <a:prstDash val="solid"/>
                     </a:lnT>
-                    <a:lnB w="0" cmpd="sng" algn="ctr" cap="flat">
-                      <a:solidFill>
-                        <a:srgbClr val="FFFFFF">
-                          <a:alpha val="0"/>
-                        </a:srgbClr>
-                      </a:solidFill>
+                    <a:lnB algn="ctr" cmpd="sng" cap="flat" w="0">
+                      <a:noFill/>
                       <a:prstDash val="solid"/>
                     </a:lnB>
+                    <a:solidFill>
+                      <a:srgbClr val="FFFFFF">
+                        <a:alpha val="0"/>
+                      </a:srgbClr>
+                    </a:solidFill>
                   </a:tcPr>
                 </a:tc>
                 <a:tc>
@@ -2740,60 +2725,51 @@
                           <a:spcPct val="100000"/>
                         </a:lnSpc>
                         <a:spcBef>
-                          <a:spcPts val="200"/>
+                          <a:spcPts val="500"/>
                         </a:spcBef>
                         <a:spcAft>
-                          <a:spcPts val="200"/>
+                          <a:spcPts val="500"/>
                         </a:spcAft>
                         <a:buNone/>
                       </a:pPr>
                       <a:r>
-                        <a:rPr sz="1100">
+                        <a:rPr cap="none" sz="1100" i="0" b="0" u="none">
                           <a:solidFill>
-                            <a:srgbClr val="111111">
+                            <a:srgbClr val="000000">
                               <a:alpha val="100000"/>
                             </a:srgbClr>
                           </a:solidFill>
-                          <a:latin typeface="Roboto"/>
-                          <a:cs typeface="Roboto"/>
+                          <a:latin typeface="Helvetica"/>
+                          <a:cs typeface="Helvetica"/>
+                          <a:ea typeface="Helvetica"/>
+                          <a:sym typeface="Helvetica"/>
                         </a:rPr>
-                        <a:t>5.52%</a:t>
+                        <a:t>1.06%</a:t>
                       </a:r>
                     </a:p>
                   </a:txBody>
-                  <a:tcPr anchor="ctr" marB="0" marT="0" marR="0" marL="0">
-                    <a:lnL w="0" cmpd="sng" algn="ctr" cap="flat">
-                      <a:solidFill>
-                        <a:srgbClr val="FFFFFF">
-                          <a:alpha val="0"/>
-                        </a:srgbClr>
-                      </a:solidFill>
+                  <a:tcPr anchor="ctr" marB="63500" marT="63500" marR="0" marL="0">
+                    <a:lnL algn="ctr" cmpd="sng" cap="flat" w="0">
+                      <a:noFill/>
                       <a:prstDash val="solid"/>
                     </a:lnL>
-                    <a:lnR w="0" cmpd="sng" algn="ctr" cap="flat">
-                      <a:solidFill>
-                        <a:srgbClr val="FFFFFF">
-                          <a:alpha val="0"/>
-                        </a:srgbClr>
-                      </a:solidFill>
+                    <a:lnR algn="ctr" cmpd="sng" cap="flat" w="0">
+                      <a:noFill/>
                       <a:prstDash val="solid"/>
                     </a:lnR>
-                    <a:lnT w="0" cmpd="sng" algn="ctr" cap="flat">
-                      <a:solidFill>
-                        <a:srgbClr val="FFFFFF">
-                          <a:alpha val="0"/>
-                        </a:srgbClr>
-                      </a:solidFill>
+                    <a:lnT algn="ctr" cmpd="sng" cap="flat" w="0">
+                      <a:noFill/>
                       <a:prstDash val="solid"/>
                     </a:lnT>
-                    <a:lnB w="0" cmpd="sng" algn="ctr" cap="flat">
-                      <a:solidFill>
-                        <a:srgbClr val="FFFFFF">
-                          <a:alpha val="0"/>
-                        </a:srgbClr>
-                      </a:solidFill>
+                    <a:lnB algn="ctr" cmpd="sng" cap="flat" w="0">
+                      <a:noFill/>
                       <a:prstDash val="solid"/>
                     </a:lnB>
+                    <a:solidFill>
+                      <a:srgbClr val="FFFFFF">
+                        <a:alpha val="0"/>
+                      </a:srgbClr>
+                    </a:solidFill>
                   </a:tcPr>
                 </a:tc>
                 <a:tc>
@@ -2806,60 +2782,51 @@
                           <a:spcPct val="100000"/>
                         </a:lnSpc>
                         <a:spcBef>
-                          <a:spcPts val="200"/>
+                          <a:spcPts val="500"/>
                         </a:spcBef>
                         <a:spcAft>
-                          <a:spcPts val="200"/>
+                          <a:spcPts val="500"/>
                         </a:spcAft>
                         <a:buNone/>
                       </a:pPr>
                       <a:r>
-                        <a:rPr sz="1100">
+                        <a:rPr cap="none" sz="1100" i="0" b="0" u="none">
                           <a:solidFill>
-                            <a:srgbClr val="111111">
+                            <a:srgbClr val="000000">
                               <a:alpha val="100000"/>
                             </a:srgbClr>
                           </a:solidFill>
-                          <a:latin typeface="Roboto"/>
-                          <a:cs typeface="Roboto"/>
+                          <a:latin typeface="Helvetica"/>
+                          <a:cs typeface="Helvetica"/>
+                          <a:ea typeface="Helvetica"/>
+                          <a:sym typeface="Helvetica"/>
                         </a:rPr>
-                        <a:t>27.1%</a:t>
+                        <a:t>23.2%</a:t>
                       </a:r>
                     </a:p>
                   </a:txBody>
-                  <a:tcPr anchor="ctr" marB="0" marT="0" marR="0" marL="0">
-                    <a:lnL w="0" cmpd="sng" algn="ctr" cap="flat">
-                      <a:solidFill>
-                        <a:srgbClr val="FFFFFF">
-                          <a:alpha val="0"/>
-                        </a:srgbClr>
-                      </a:solidFill>
+                  <a:tcPr anchor="ctr" marB="63500" marT="63500" marR="0" marL="0">
+                    <a:lnL algn="ctr" cmpd="sng" cap="flat" w="0">
+                      <a:noFill/>
                       <a:prstDash val="solid"/>
                     </a:lnL>
-                    <a:lnR w="0" cmpd="sng" algn="ctr" cap="flat">
-                      <a:solidFill>
-                        <a:srgbClr val="FFFFFF">
-                          <a:alpha val="0"/>
-                        </a:srgbClr>
-                      </a:solidFill>
+                    <a:lnR algn="ctr" cmpd="sng" cap="flat" w="0">
+                      <a:noFill/>
                       <a:prstDash val="solid"/>
                     </a:lnR>
-                    <a:lnT w="0" cmpd="sng" algn="ctr" cap="flat">
-                      <a:solidFill>
-                        <a:srgbClr val="FFFFFF">
-                          <a:alpha val="0"/>
-                        </a:srgbClr>
-                      </a:solidFill>
+                    <a:lnT algn="ctr" cmpd="sng" cap="flat" w="0">
+                      <a:noFill/>
                       <a:prstDash val="solid"/>
                     </a:lnT>
-                    <a:lnB w="0" cmpd="sng" algn="ctr" cap="flat">
-                      <a:solidFill>
-                        <a:srgbClr val="FFFFFF">
-                          <a:alpha val="0"/>
-                        </a:srgbClr>
-                      </a:solidFill>
+                    <a:lnB algn="ctr" cmpd="sng" cap="flat" w="0">
+                      <a:noFill/>
                       <a:prstDash val="solid"/>
                     </a:lnB>
+                    <a:solidFill>
+                      <a:srgbClr val="FFFFFF">
+                        <a:alpha val="0"/>
+                      </a:srgbClr>
+                    </a:solidFill>
                   </a:tcPr>
                 </a:tc>
                 <a:tc>
@@ -2872,60 +2839,51 @@
                           <a:spcPct val="100000"/>
                         </a:lnSpc>
                         <a:spcBef>
-                          <a:spcPts val="200"/>
+                          <a:spcPts val="500"/>
                         </a:spcBef>
                         <a:spcAft>
-                          <a:spcPts val="200"/>
+                          <a:spcPts val="500"/>
                         </a:spcAft>
                         <a:buNone/>
                       </a:pPr>
                       <a:r>
-                        <a:rPr sz="1100">
+                        <a:rPr cap="none" sz="1100" i="0" b="0" u="none">
                           <a:solidFill>
-                            <a:srgbClr val="111111">
+                            <a:srgbClr val="000000">
                               <a:alpha val="100000"/>
                             </a:srgbClr>
                           </a:solidFill>
-                          <a:latin typeface="Roboto"/>
-                          <a:cs typeface="Roboto"/>
+                          <a:latin typeface="Helvetica"/>
+                          <a:cs typeface="Helvetica"/>
+                          <a:ea typeface="Helvetica"/>
+                          <a:sym typeface="Helvetica"/>
                         </a:rPr>
-                        <a:t>82.3%</a:t>
+                        <a:t>73.53%</a:t>
                       </a:r>
                     </a:p>
                   </a:txBody>
-                  <a:tcPr anchor="ctr" marB="0" marT="0" marR="0" marL="0">
-                    <a:lnL w="0" cmpd="sng" algn="ctr" cap="flat">
-                      <a:solidFill>
-                        <a:srgbClr val="FFFFFF">
-                          <a:alpha val="0"/>
-                        </a:srgbClr>
-                      </a:solidFill>
+                  <a:tcPr anchor="ctr" marB="63500" marT="63500" marR="0" marL="0">
+                    <a:lnL algn="ctr" cmpd="sng" cap="flat" w="0">
+                      <a:noFill/>
                       <a:prstDash val="solid"/>
                     </a:lnL>
-                    <a:lnR w="0" cmpd="sng" algn="ctr" cap="flat">
-                      <a:solidFill>
-                        <a:srgbClr val="FFFFFF">
-                          <a:alpha val="0"/>
-                        </a:srgbClr>
-                      </a:solidFill>
+                    <a:lnR algn="ctr" cmpd="sng" cap="flat" w="0">
+                      <a:noFill/>
                       <a:prstDash val="solid"/>
                     </a:lnR>
-                    <a:lnT w="0" cmpd="sng" algn="ctr" cap="flat">
-                      <a:solidFill>
-                        <a:srgbClr val="FFFFFF">
-                          <a:alpha val="0"/>
-                        </a:srgbClr>
-                      </a:solidFill>
+                    <a:lnT algn="ctr" cmpd="sng" cap="flat" w="0">
+                      <a:noFill/>
                       <a:prstDash val="solid"/>
                     </a:lnT>
-                    <a:lnB w="0" cmpd="sng" algn="ctr" cap="flat">
-                      <a:solidFill>
-                        <a:srgbClr val="FFFFFF">
-                          <a:alpha val="0"/>
-                        </a:srgbClr>
-                      </a:solidFill>
+                    <a:lnB algn="ctr" cmpd="sng" cap="flat" w="0">
+                      <a:noFill/>
                       <a:prstDash val="solid"/>
                     </a:lnB>
+                    <a:solidFill>
+                      <a:srgbClr val="FFFFFF">
+                        <a:alpha val="0"/>
+                      </a:srgbClr>
+                    </a:solidFill>
                   </a:tcPr>
                 </a:tc>
                 <a:tc>
@@ -2938,60 +2896,51 @@
                           <a:spcPct val="100000"/>
                         </a:lnSpc>
                         <a:spcBef>
-                          <a:spcPts val="200"/>
+                          <a:spcPts val="500"/>
                         </a:spcBef>
                         <a:spcAft>
-                          <a:spcPts val="200"/>
+                          <a:spcPts val="500"/>
                         </a:spcAft>
                         <a:buNone/>
                       </a:pPr>
                       <a:r>
-                        <a:rPr sz="1100">
+                        <a:rPr cap="none" sz="1100" i="0" b="0" u="none">
                           <a:solidFill>
-                            <a:srgbClr val="111111">
+                            <a:srgbClr val="000000">
                               <a:alpha val="100000"/>
                             </a:srgbClr>
                           </a:solidFill>
-                          <a:latin typeface="Roboto"/>
-                          <a:cs typeface="Roboto"/>
+                          <a:latin typeface="Helvetica"/>
+                          <a:cs typeface="Helvetica"/>
+                          <a:ea typeface="Helvetica"/>
+                          <a:sym typeface="Helvetica"/>
                         </a:rPr>
-                        <a:t>160%</a:t>
+                        <a:t>171%</a:t>
                       </a:r>
                     </a:p>
                   </a:txBody>
-                  <a:tcPr anchor="ctr" marB="0" marT="0" marR="0" marL="0">
-                    <a:lnL w="0" cmpd="sng" algn="ctr" cap="flat">
-                      <a:solidFill>
-                        <a:srgbClr val="FFFFFF">
-                          <a:alpha val="0"/>
-                        </a:srgbClr>
-                      </a:solidFill>
+                  <a:tcPr anchor="ctr" marB="63500" marT="63500" marR="0" marL="0">
+                    <a:lnL algn="ctr" cmpd="sng" cap="flat" w="0">
+                      <a:noFill/>
                       <a:prstDash val="solid"/>
                     </a:lnL>
-                    <a:lnR w="0" cmpd="sng" algn="ctr" cap="flat">
-                      <a:solidFill>
-                        <a:srgbClr val="FFFFFF">
-                          <a:alpha val="0"/>
-                        </a:srgbClr>
-                      </a:solidFill>
+                    <a:lnR algn="ctr" cmpd="sng" cap="flat" w="0">
+                      <a:noFill/>
                       <a:prstDash val="solid"/>
                     </a:lnR>
-                    <a:lnT w="0" cmpd="sng" algn="ctr" cap="flat">
-                      <a:solidFill>
-                        <a:srgbClr val="FFFFFF">
-                          <a:alpha val="0"/>
-                        </a:srgbClr>
-                      </a:solidFill>
+                    <a:lnT algn="ctr" cmpd="sng" cap="flat" w="0">
+                      <a:noFill/>
                       <a:prstDash val="solid"/>
                     </a:lnT>
-                    <a:lnB w="0" cmpd="sng" algn="ctr" cap="flat">
-                      <a:solidFill>
-                        <a:srgbClr val="FFFFFF">
-                          <a:alpha val="0"/>
-                        </a:srgbClr>
-                      </a:solidFill>
+                    <a:lnB algn="ctr" cmpd="sng" cap="flat" w="0">
+                      <a:noFill/>
                       <a:prstDash val="solid"/>
                     </a:lnB>
+                    <a:solidFill>
+                      <a:srgbClr val="FFFFFF">
+                        <a:alpha val="0"/>
+                      </a:srgbClr>
+                    </a:solidFill>
                   </a:tcPr>
                 </a:tc>
                 <a:tc>
@@ -3004,60 +2953,51 @@
                           <a:spcPct val="100000"/>
                         </a:lnSpc>
                         <a:spcBef>
-                          <a:spcPts val="200"/>
+                          <a:spcPts val="500"/>
                         </a:spcBef>
                         <a:spcAft>
-                          <a:spcPts val="200"/>
+                          <a:spcPts val="500"/>
                         </a:spcAft>
                         <a:buNone/>
                       </a:pPr>
                       <a:r>
-                        <a:rPr sz="1100">
+                        <a:rPr cap="none" sz="1100" i="0" b="0" u="none">
                           <a:solidFill>
-                            <a:srgbClr val="111111">
+                            <a:srgbClr val="000000">
                               <a:alpha val="100000"/>
                             </a:srgbClr>
                           </a:solidFill>
-                          <a:latin typeface="Roboto"/>
-                          <a:cs typeface="Roboto"/>
+                          <a:latin typeface="Helvetica"/>
+                          <a:cs typeface="Helvetica"/>
+                          <a:ea typeface="Helvetica"/>
+                          <a:sym typeface="Helvetica"/>
                         </a:rPr>
-                        <a:t>223%</a:t>
+                        <a:t>197%</a:t>
                       </a:r>
                     </a:p>
                   </a:txBody>
-                  <a:tcPr anchor="ctr" marB="0" marT="0" marR="0" marL="0">
-                    <a:lnL w="0" cmpd="sng" algn="ctr" cap="flat">
-                      <a:solidFill>
-                        <a:srgbClr val="FFFFFF">
-                          <a:alpha val="0"/>
-                        </a:srgbClr>
-                      </a:solidFill>
+                  <a:tcPr anchor="ctr" marB="63500" marT="63500" marR="0" marL="0">
+                    <a:lnL algn="ctr" cmpd="sng" cap="flat" w="0">
+                      <a:noFill/>
                       <a:prstDash val="solid"/>
                     </a:lnL>
-                    <a:lnR w="0" cmpd="sng" algn="ctr" cap="flat">
-                      <a:solidFill>
-                        <a:srgbClr val="FFFFFF">
-                          <a:alpha val="0"/>
-                        </a:srgbClr>
-                      </a:solidFill>
+                    <a:lnR algn="ctr" cmpd="sng" cap="flat" w="0">
+                      <a:noFill/>
                       <a:prstDash val="solid"/>
                     </a:lnR>
-                    <a:lnT w="0" cmpd="sng" algn="ctr" cap="flat">
-                      <a:solidFill>
-                        <a:srgbClr val="FFFFFF">
-                          <a:alpha val="0"/>
-                        </a:srgbClr>
-                      </a:solidFill>
+                    <a:lnT algn="ctr" cmpd="sng" cap="flat" w="0">
+                      <a:noFill/>
                       <a:prstDash val="solid"/>
                     </a:lnT>
-                    <a:lnB w="0" cmpd="sng" algn="ctr" cap="flat">
-                      <a:solidFill>
-                        <a:srgbClr val="FFFFFF">
-                          <a:alpha val="0"/>
-                        </a:srgbClr>
-                      </a:solidFill>
+                    <a:lnB algn="ctr" cmpd="sng" cap="flat" w="0">
+                      <a:noFill/>
                       <a:prstDash val="solid"/>
                     </a:lnB>
+                    <a:solidFill>
+                      <a:srgbClr val="FFFFFF">
+                        <a:alpha val="0"/>
+                      </a:srgbClr>
+                    </a:solidFill>
                   </a:tcPr>
                 </a:tc>
               </a:tr>
@@ -3072,60 +3012,51 @@
                           <a:spcPct val="100000"/>
                         </a:lnSpc>
                         <a:spcBef>
-                          <a:spcPts val="200"/>
+                          <a:spcPts val="500"/>
                         </a:spcBef>
                         <a:spcAft>
-                          <a:spcPts val="200"/>
+                          <a:spcPts val="500"/>
                         </a:spcAft>
                         <a:buNone/>
                       </a:pPr>
                       <a:r>
-                        <a:rPr sz="1100">
+                        <a:rPr cap="none" sz="1100" i="0" b="0" u="none">
                           <a:solidFill>
-                            <a:srgbClr val="111111">
+                            <a:srgbClr val="000000">
                               <a:alpha val="100000"/>
                             </a:srgbClr>
                           </a:solidFill>
-                          <a:latin typeface="Roboto"/>
-                          <a:cs typeface="Roboto"/>
+                          <a:latin typeface="Helvetica"/>
+                          <a:cs typeface="Helvetica"/>
+                          <a:ea typeface="Helvetica"/>
+                          <a:sym typeface="Helvetica"/>
                         </a:rPr>
-                        <a:t>FB</a:t>
+                        <a:t>GOOG</a:t>
                       </a:r>
                     </a:p>
                   </a:txBody>
-                  <a:tcPr anchor="ctr" marB="0" marT="0" marR="0" marL="0">
-                    <a:lnL w="0" cmpd="sng" algn="ctr" cap="flat">
-                      <a:solidFill>
-                        <a:srgbClr val="FFFFFF">
-                          <a:alpha val="0"/>
-                        </a:srgbClr>
-                      </a:solidFill>
+                  <a:tcPr anchor="ctr" marB="63500" marT="63500" marR="0" marL="0">
+                    <a:lnL algn="ctr" cmpd="sng" cap="flat" w="0">
+                      <a:noFill/>
                       <a:prstDash val="solid"/>
                     </a:lnL>
-                    <a:lnR w="0" cmpd="sng" algn="ctr" cap="flat">
-                      <a:solidFill>
-                        <a:srgbClr val="FFFFFF">
-                          <a:alpha val="0"/>
-                        </a:srgbClr>
-                      </a:solidFill>
+                    <a:lnR algn="ctr" cmpd="sng" cap="flat" w="0">
+                      <a:noFill/>
                       <a:prstDash val="solid"/>
                     </a:lnR>
-                    <a:lnT w="0" cmpd="sng" algn="ctr" cap="flat">
-                      <a:solidFill>
-                        <a:srgbClr val="FFFFFF">
-                          <a:alpha val="0"/>
-                        </a:srgbClr>
-                      </a:solidFill>
+                    <a:lnT algn="ctr" cmpd="sng" cap="flat" w="0">
+                      <a:noFill/>
                       <a:prstDash val="solid"/>
                     </a:lnT>
-                    <a:lnB w="0" cmpd="sng" algn="ctr" cap="flat">
-                      <a:solidFill>
-                        <a:srgbClr val="FFFFFF">
-                          <a:alpha val="0"/>
-                        </a:srgbClr>
-                      </a:solidFill>
+                    <a:lnB algn="ctr" cmpd="sng" cap="flat" w="0">
+                      <a:noFill/>
                       <a:prstDash val="solid"/>
                     </a:lnB>
+                    <a:solidFill>
+                      <a:srgbClr val="FFFFFF">
+                        <a:alpha val="0"/>
+                      </a:srgbClr>
+                    </a:solidFill>
                   </a:tcPr>
                 </a:tc>
                 <a:tc>
@@ -3138,60 +3069,51 @@
                           <a:spcPct val="100000"/>
                         </a:lnSpc>
                         <a:spcBef>
-                          <a:spcPts val="200"/>
+                          <a:spcPts val="500"/>
                         </a:spcBef>
                         <a:spcAft>
-                          <a:spcPts val="200"/>
+                          <a:spcPts val="500"/>
                         </a:spcAft>
                         <a:buNone/>
                       </a:pPr>
                       <a:r>
-                        <a:rPr sz="1100">
+                        <a:rPr cap="none" sz="1100" i="0" b="0" u="none">
                           <a:solidFill>
-                            <a:srgbClr val="111111">
+                            <a:srgbClr val="000000">
                               <a:alpha val="100000"/>
                             </a:srgbClr>
                           </a:solidFill>
-                          <a:latin typeface="Roboto"/>
-                          <a:cs typeface="Roboto"/>
+                          <a:latin typeface="Helvetica"/>
+                          <a:cs typeface="Helvetica"/>
+                          <a:ea typeface="Helvetica"/>
+                          <a:sym typeface="Helvetica"/>
                         </a:rPr>
-                        <a:t>9.16%</a:t>
+                        <a:t>0.51%</a:t>
                       </a:r>
                     </a:p>
                   </a:txBody>
-                  <a:tcPr anchor="ctr" marB="0" marT="0" marR="0" marL="0">
-                    <a:lnL w="0" cmpd="sng" algn="ctr" cap="flat">
-                      <a:solidFill>
-                        <a:srgbClr val="FFFFFF">
-                          <a:alpha val="0"/>
-                        </a:srgbClr>
-                      </a:solidFill>
+                  <a:tcPr anchor="ctr" marB="63500" marT="63500" marR="0" marL="0">
+                    <a:lnL algn="ctr" cmpd="sng" cap="flat" w="0">
+                      <a:noFill/>
                       <a:prstDash val="solid"/>
                     </a:lnL>
-                    <a:lnR w="0" cmpd="sng" algn="ctr" cap="flat">
-                      <a:solidFill>
-                        <a:srgbClr val="FFFFFF">
-                          <a:alpha val="0"/>
-                        </a:srgbClr>
-                      </a:solidFill>
+                    <a:lnR algn="ctr" cmpd="sng" cap="flat" w="0">
+                      <a:noFill/>
                       <a:prstDash val="solid"/>
                     </a:lnR>
-                    <a:lnT w="0" cmpd="sng" algn="ctr" cap="flat">
-                      <a:solidFill>
-                        <a:srgbClr val="FFFFFF">
-                          <a:alpha val="0"/>
-                        </a:srgbClr>
-                      </a:solidFill>
+                    <a:lnT algn="ctr" cmpd="sng" cap="flat" w="0">
+                      <a:noFill/>
                       <a:prstDash val="solid"/>
                     </a:lnT>
-                    <a:lnB w="0" cmpd="sng" algn="ctr" cap="flat">
-                      <a:solidFill>
-                        <a:srgbClr val="FFFFFF">
-                          <a:alpha val="0"/>
-                        </a:srgbClr>
-                      </a:solidFill>
+                    <a:lnB algn="ctr" cmpd="sng" cap="flat" w="0">
+                      <a:noFill/>
                       <a:prstDash val="solid"/>
                     </a:lnB>
+                    <a:solidFill>
+                      <a:srgbClr val="FFFFFF">
+                        <a:alpha val="0"/>
+                      </a:srgbClr>
+                    </a:solidFill>
                   </a:tcPr>
                 </a:tc>
                 <a:tc>
@@ -3204,60 +3126,51 @@
                           <a:spcPct val="100000"/>
                         </a:lnSpc>
                         <a:spcBef>
-                          <a:spcPts val="200"/>
+                          <a:spcPts val="500"/>
                         </a:spcBef>
                         <a:spcAft>
-                          <a:spcPts val="200"/>
+                          <a:spcPts val="500"/>
                         </a:spcAft>
                         <a:buNone/>
                       </a:pPr>
                       <a:r>
-                        <a:rPr sz="1100">
+                        <a:rPr cap="none" sz="1100" i="0" b="0" u="none">
                           <a:solidFill>
-                            <a:srgbClr val="111111">
+                            <a:srgbClr val="000000">
                               <a:alpha val="100000"/>
                             </a:srgbClr>
                           </a:solidFill>
-                          <a:latin typeface="Roboto"/>
-                          <a:cs typeface="Roboto"/>
+                          <a:latin typeface="Helvetica"/>
+                          <a:cs typeface="Helvetica"/>
+                          <a:ea typeface="Helvetica"/>
+                          <a:sym typeface="Helvetica"/>
                         </a:rPr>
-                        <a:t>19.7%</a:t>
+                        <a:t>0.8%</a:t>
                       </a:r>
                     </a:p>
                   </a:txBody>
-                  <a:tcPr anchor="ctr" marB="0" marT="0" marR="0" marL="0">
-                    <a:lnL w="0" cmpd="sng" algn="ctr" cap="flat">
-                      <a:solidFill>
-                        <a:srgbClr val="FFFFFF">
-                          <a:alpha val="0"/>
-                        </a:srgbClr>
-                      </a:solidFill>
+                  <a:tcPr anchor="ctr" marB="63500" marT="63500" marR="0" marL="0">
+                    <a:lnL algn="ctr" cmpd="sng" cap="flat" w="0">
+                      <a:noFill/>
                       <a:prstDash val="solid"/>
                     </a:lnL>
-                    <a:lnR w="0" cmpd="sng" algn="ctr" cap="flat">
-                      <a:solidFill>
-                        <a:srgbClr val="FFFFFF">
-                          <a:alpha val="0"/>
-                        </a:srgbClr>
-                      </a:solidFill>
+                    <a:lnR algn="ctr" cmpd="sng" cap="flat" w="0">
+                      <a:noFill/>
                       <a:prstDash val="solid"/>
                     </a:lnR>
-                    <a:lnT w="0" cmpd="sng" algn="ctr" cap="flat">
-                      <a:solidFill>
-                        <a:srgbClr val="FFFFFF">
-                          <a:alpha val="0"/>
-                        </a:srgbClr>
-                      </a:solidFill>
+                    <a:lnT algn="ctr" cmpd="sng" cap="flat" w="0">
+                      <a:noFill/>
                       <a:prstDash val="solid"/>
                     </a:lnT>
-                    <a:lnB w="0" cmpd="sng" algn="ctr" cap="flat">
-                      <a:solidFill>
-                        <a:srgbClr val="FFFFFF">
-                          <a:alpha val="0"/>
-                        </a:srgbClr>
-                      </a:solidFill>
+                    <a:lnB algn="ctr" cmpd="sng" cap="flat" w="0">
+                      <a:noFill/>
                       <a:prstDash val="solid"/>
                     </a:lnB>
+                    <a:solidFill>
+                      <a:srgbClr val="FFFFFF">
+                        <a:alpha val="0"/>
+                      </a:srgbClr>
+                    </a:solidFill>
                   </a:tcPr>
                 </a:tc>
                 <a:tc>
@@ -3270,60 +3183,51 @@
                           <a:spcPct val="100000"/>
                         </a:lnSpc>
                         <a:spcBef>
-                          <a:spcPts val="200"/>
+                          <a:spcPts val="500"/>
                         </a:spcBef>
                         <a:spcAft>
-                          <a:spcPts val="200"/>
+                          <a:spcPts val="500"/>
                         </a:spcAft>
                         <a:buNone/>
                       </a:pPr>
                       <a:r>
-                        <a:rPr sz="1100">
+                        <a:rPr cap="none" sz="1100" i="0" b="0" u="none">
                           <a:solidFill>
-                            <a:srgbClr val="111111">
+                            <a:srgbClr val="000000">
                               <a:alpha val="100000"/>
                             </a:srgbClr>
                           </a:solidFill>
-                          <a:latin typeface="Roboto"/>
-                          <a:cs typeface="Roboto"/>
+                          <a:latin typeface="Helvetica"/>
+                          <a:cs typeface="Helvetica"/>
+                          <a:ea typeface="Helvetica"/>
+                          <a:sym typeface="Helvetica"/>
                         </a:rPr>
-                        <a:t>58.6%</a:t>
+                        <a:t>24.58%</a:t>
                       </a:r>
                     </a:p>
                   </a:txBody>
-                  <a:tcPr anchor="ctr" marB="0" marT="0" marR="0" marL="0">
-                    <a:lnL w="0" cmpd="sng" algn="ctr" cap="flat">
-                      <a:solidFill>
-                        <a:srgbClr val="FFFFFF">
-                          <a:alpha val="0"/>
-                        </a:srgbClr>
-                      </a:solidFill>
+                  <a:tcPr anchor="ctr" marB="63500" marT="63500" marR="0" marL="0">
+                    <a:lnL algn="ctr" cmpd="sng" cap="flat" w="0">
+                      <a:noFill/>
                       <a:prstDash val="solid"/>
                     </a:lnL>
-                    <a:lnR w="0" cmpd="sng" algn="ctr" cap="flat">
-                      <a:solidFill>
-                        <a:srgbClr val="FFFFFF">
-                          <a:alpha val="0"/>
-                        </a:srgbClr>
-                      </a:solidFill>
+                    <a:lnR algn="ctr" cmpd="sng" cap="flat" w="0">
+                      <a:noFill/>
                       <a:prstDash val="solid"/>
                     </a:lnR>
-                    <a:lnT w="0" cmpd="sng" algn="ctr" cap="flat">
-                      <a:solidFill>
-                        <a:srgbClr val="FFFFFF">
-                          <a:alpha val="0"/>
-                        </a:srgbClr>
-                      </a:solidFill>
+                    <a:lnT algn="ctr" cmpd="sng" cap="flat" w="0">
+                      <a:noFill/>
                       <a:prstDash val="solid"/>
                     </a:lnT>
-                    <a:lnB w="0" cmpd="sng" algn="ctr" cap="flat">
-                      <a:solidFill>
-                        <a:srgbClr val="FFFFFF">
-                          <a:alpha val="0"/>
-                        </a:srgbClr>
-                      </a:solidFill>
+                    <a:lnB algn="ctr" cmpd="sng" cap="flat" w="0">
+                      <a:noFill/>
                       <a:prstDash val="solid"/>
                     </a:lnB>
+                    <a:solidFill>
+                      <a:srgbClr val="FFFFFF">
+                        <a:alpha val="0"/>
+                      </a:srgbClr>
+                    </a:solidFill>
                   </a:tcPr>
                 </a:tc>
                 <a:tc>
@@ -3336,60 +3240,51 @@
                           <a:spcPct val="100000"/>
                         </a:lnSpc>
                         <a:spcBef>
-                          <a:spcPts val="200"/>
+                          <a:spcPts val="500"/>
                         </a:spcBef>
                         <a:spcAft>
-                          <a:spcPts val="200"/>
+                          <a:spcPts val="500"/>
                         </a:spcAft>
                         <a:buNone/>
                       </a:pPr>
                       <a:r>
-                        <a:rPr sz="1100">
+                        <a:rPr cap="none" sz="1100" i="0" b="0" u="none">
                           <a:solidFill>
-                            <a:srgbClr val="111111">
+                            <a:srgbClr val="000000">
                               <a:alpha val="100000"/>
                             </a:srgbClr>
                           </a:solidFill>
-                          <a:latin typeface="Roboto"/>
-                          <a:cs typeface="Roboto"/>
+                          <a:latin typeface="Helvetica"/>
+                          <a:cs typeface="Helvetica"/>
+                          <a:ea typeface="Helvetica"/>
+                          <a:sym typeface="Helvetica"/>
                         </a:rPr>
-                        <a:t>77%</a:t>
+                        <a:t>32%</a:t>
                       </a:r>
                     </a:p>
                   </a:txBody>
-                  <a:tcPr anchor="ctr" marB="0" marT="0" marR="0" marL="0">
-                    <a:lnL w="0" cmpd="sng" algn="ctr" cap="flat">
-                      <a:solidFill>
-                        <a:srgbClr val="FFFFFF">
-                          <a:alpha val="0"/>
-                        </a:srgbClr>
-                      </a:solidFill>
+                  <a:tcPr anchor="ctr" marB="63500" marT="63500" marR="0" marL="0">
+                    <a:lnL algn="ctr" cmpd="sng" cap="flat" w="0">
+                      <a:noFill/>
                       <a:prstDash val="solid"/>
                     </a:lnL>
-                    <a:lnR w="0" cmpd="sng" algn="ctr" cap="flat">
-                      <a:solidFill>
-                        <a:srgbClr val="FFFFFF">
-                          <a:alpha val="0"/>
-                        </a:srgbClr>
-                      </a:solidFill>
+                    <a:lnR algn="ctr" cmpd="sng" cap="flat" w="0">
+                      <a:noFill/>
                       <a:prstDash val="solid"/>
                     </a:lnR>
-                    <a:lnT w="0" cmpd="sng" algn="ctr" cap="flat">
-                      <a:solidFill>
-                        <a:srgbClr val="FFFFFF">
-                          <a:alpha val="0"/>
-                        </a:srgbClr>
-                      </a:solidFill>
+                    <a:lnT algn="ctr" cmpd="sng" cap="flat" w="0">
+                      <a:noFill/>
                       <a:prstDash val="solid"/>
                     </a:lnT>
-                    <a:lnB w="0" cmpd="sng" algn="ctr" cap="flat">
-                      <a:solidFill>
-                        <a:srgbClr val="FFFFFF">
-                          <a:alpha val="0"/>
-                        </a:srgbClr>
-                      </a:solidFill>
+                    <a:lnB algn="ctr" cmpd="sng" cap="flat" w="0">
+                      <a:noFill/>
                       <a:prstDash val="solid"/>
                     </a:lnB>
+                    <a:solidFill>
+                      <a:srgbClr val="FFFFFF">
+                        <a:alpha val="0"/>
+                      </a:srgbClr>
+                    </a:solidFill>
                   </a:tcPr>
                 </a:tc>
                 <a:tc>
@@ -3402,60 +3297,51 @@
                           <a:spcPct val="100000"/>
                         </a:lnSpc>
                         <a:spcBef>
-                          <a:spcPts val="200"/>
+                          <a:spcPts val="500"/>
                         </a:spcBef>
                         <a:spcAft>
-                          <a:spcPts val="200"/>
+                          <a:spcPts val="500"/>
                         </a:spcAft>
                         <a:buNone/>
                       </a:pPr>
                       <a:r>
-                        <a:rPr sz="1100">
+                        <a:rPr cap="none" sz="1100" i="0" b="0" u="none">
                           <a:solidFill>
-                            <a:srgbClr val="111111">
+                            <a:srgbClr val="000000">
                               <a:alpha val="100000"/>
                             </a:srgbClr>
                           </a:solidFill>
-                          <a:latin typeface="Roboto"/>
-                          <a:cs typeface="Roboto"/>
+                          <a:latin typeface="Helvetica"/>
+                          <a:cs typeface="Helvetica"/>
+                          <a:ea typeface="Helvetica"/>
+                          <a:sym typeface="Helvetica"/>
                         </a:rPr>
-                        <a:t>116%</a:t>
+                        <a:t>44%</a:t>
                       </a:r>
                     </a:p>
                   </a:txBody>
-                  <a:tcPr anchor="ctr" marB="0" marT="0" marR="0" marL="0">
-                    <a:lnL w="0" cmpd="sng" algn="ctr" cap="flat">
-                      <a:solidFill>
-                        <a:srgbClr val="FFFFFF">
-                          <a:alpha val="0"/>
-                        </a:srgbClr>
-                      </a:solidFill>
+                  <a:tcPr anchor="ctr" marB="63500" marT="63500" marR="0" marL="0">
+                    <a:lnL algn="ctr" cmpd="sng" cap="flat" w="0">
+                      <a:noFill/>
                       <a:prstDash val="solid"/>
                     </a:lnL>
-                    <a:lnR w="0" cmpd="sng" algn="ctr" cap="flat">
-                      <a:solidFill>
-                        <a:srgbClr val="FFFFFF">
-                          <a:alpha val="0"/>
-                        </a:srgbClr>
-                      </a:solidFill>
+                    <a:lnR algn="ctr" cmpd="sng" cap="flat" w="0">
+                      <a:noFill/>
                       <a:prstDash val="solid"/>
                     </a:lnR>
-                    <a:lnT w="0" cmpd="sng" algn="ctr" cap="flat">
-                      <a:solidFill>
-                        <a:srgbClr val="FFFFFF">
-                          <a:alpha val="0"/>
-                        </a:srgbClr>
-                      </a:solidFill>
+                    <a:lnT algn="ctr" cmpd="sng" cap="flat" w="0">
+                      <a:noFill/>
                       <a:prstDash val="solid"/>
                     </a:lnT>
-                    <a:lnB w="0" cmpd="sng" algn="ctr" cap="flat">
-                      <a:solidFill>
-                        <a:srgbClr val="FFFFFF">
-                          <a:alpha val="0"/>
-                        </a:srgbClr>
-                      </a:solidFill>
+                    <a:lnB algn="ctr" cmpd="sng" cap="flat" w="0">
+                      <a:noFill/>
                       <a:prstDash val="solid"/>
                     </a:lnB>
+                    <a:solidFill>
+                      <a:srgbClr val="FFFFFF">
+                        <a:alpha val="0"/>
+                      </a:srgbClr>
+                    </a:solidFill>
                   </a:tcPr>
                 </a:tc>
               </a:tr>
@@ -3470,60 +3356,51 @@
                           <a:spcPct val="100000"/>
                         </a:lnSpc>
                         <a:spcBef>
-                          <a:spcPts val="200"/>
+                          <a:spcPts val="500"/>
                         </a:spcBef>
                         <a:spcAft>
-                          <a:spcPts val="200"/>
+                          <a:spcPts val="500"/>
                         </a:spcAft>
                         <a:buNone/>
                       </a:pPr>
                       <a:r>
-                        <a:rPr sz="1100">
+                        <a:rPr cap="none" sz="1100" i="0" b="0" u="none">
                           <a:solidFill>
-                            <a:srgbClr val="111111">
+                            <a:srgbClr val="000000">
                               <a:alpha val="100000"/>
                             </a:srgbClr>
                           </a:solidFill>
-                          <a:latin typeface="Roboto"/>
-                          <a:cs typeface="Roboto"/>
+                          <a:latin typeface="Helvetica"/>
+                          <a:cs typeface="Helvetica"/>
+                          <a:ea typeface="Helvetica"/>
+                          <a:sym typeface="Helvetica"/>
                         </a:rPr>
-                        <a:t>GOOG</a:t>
+                        <a:t>META</a:t>
                       </a:r>
                     </a:p>
                   </a:txBody>
-                  <a:tcPr anchor="ctr" marB="0" marT="0" marR="0" marL="0">
-                    <a:lnL w="0" cmpd="sng" algn="ctr" cap="flat">
-                      <a:solidFill>
-                        <a:srgbClr val="FFFFFF">
-                          <a:alpha val="0"/>
-                        </a:srgbClr>
-                      </a:solidFill>
+                  <a:tcPr anchor="ctr" marB="63500" marT="63500" marR="0" marL="0">
+                    <a:lnL algn="ctr" cmpd="sng" cap="flat" w="0">
+                      <a:noFill/>
                       <a:prstDash val="solid"/>
                     </a:lnL>
-                    <a:lnR w="0" cmpd="sng" algn="ctr" cap="flat">
-                      <a:solidFill>
-                        <a:srgbClr val="FFFFFF">
-                          <a:alpha val="0"/>
-                        </a:srgbClr>
-                      </a:solidFill>
+                    <a:lnR algn="ctr" cmpd="sng" cap="flat" w="0">
+                      <a:noFill/>
                       <a:prstDash val="solid"/>
                     </a:lnR>
-                    <a:lnT w="0" cmpd="sng" algn="ctr" cap="flat">
-                      <a:solidFill>
-                        <a:srgbClr val="FFFFFF">
-                          <a:alpha val="0"/>
-                        </a:srgbClr>
-                      </a:solidFill>
+                    <a:lnT algn="ctr" cmpd="sng" cap="flat" w="0">
+                      <a:noFill/>
                       <a:prstDash val="solid"/>
                     </a:lnT>
-                    <a:lnB w="0" cmpd="sng" algn="ctr" cap="flat">
-                      <a:solidFill>
-                        <a:srgbClr val="FFFFFF">
-                          <a:alpha val="0"/>
-                        </a:srgbClr>
-                      </a:solidFill>
+                    <a:lnB algn="ctr" cmpd="sng" cap="flat" w="0">
+                      <a:noFill/>
                       <a:prstDash val="solid"/>
                     </a:lnB>
+                    <a:solidFill>
+                      <a:srgbClr val="FFFFFF">
+                        <a:alpha val="0"/>
+                      </a:srgbClr>
+                    </a:solidFill>
                   </a:tcPr>
                 </a:tc>
                 <a:tc>
@@ -3536,60 +3413,51 @@
                           <a:spcPct val="100000"/>
                         </a:lnSpc>
                         <a:spcBef>
-                          <a:spcPts val="200"/>
+                          <a:spcPts val="500"/>
                         </a:spcBef>
                         <a:spcAft>
-                          <a:spcPts val="200"/>
+                          <a:spcPts val="500"/>
                         </a:spcAft>
                         <a:buNone/>
                       </a:pPr>
                       <a:r>
-                        <a:rPr sz="1100">
+                        <a:rPr cap="none" sz="1100" i="0" b="0" u="none">
                           <a:solidFill>
-                            <a:srgbClr val="111111">
+                            <a:srgbClr val="000000">
                               <a:alpha val="100000"/>
                             </a:srgbClr>
                           </a:solidFill>
-                          <a:latin typeface="Roboto"/>
-                          <a:cs typeface="Roboto"/>
+                          <a:latin typeface="Helvetica"/>
+                          <a:cs typeface="Helvetica"/>
+                          <a:ea typeface="Helvetica"/>
+                          <a:sym typeface="Helvetica"/>
                         </a:rPr>
-                        <a:t>3.96%</a:t>
+                        <a:t>-1.52%</a:t>
                       </a:r>
                     </a:p>
                   </a:txBody>
-                  <a:tcPr anchor="ctr" marB="0" marT="0" marR="0" marL="0">
-                    <a:lnL w="0" cmpd="sng" algn="ctr" cap="flat">
-                      <a:solidFill>
-                        <a:srgbClr val="FFFFFF">
-                          <a:alpha val="0"/>
-                        </a:srgbClr>
-                      </a:solidFill>
+                  <a:tcPr anchor="ctr" marB="63500" marT="63500" marR="0" marL="0">
+                    <a:lnL algn="ctr" cmpd="sng" cap="flat" w="0">
+                      <a:noFill/>
                       <a:prstDash val="solid"/>
                     </a:lnL>
-                    <a:lnR w="0" cmpd="sng" algn="ctr" cap="flat">
-                      <a:solidFill>
-                        <a:srgbClr val="FFFFFF">
-                          <a:alpha val="0"/>
-                        </a:srgbClr>
-                      </a:solidFill>
+                    <a:lnR algn="ctr" cmpd="sng" cap="flat" w="0">
+                      <a:noFill/>
                       <a:prstDash val="solid"/>
                     </a:lnR>
-                    <a:lnT w="0" cmpd="sng" algn="ctr" cap="flat">
-                      <a:solidFill>
-                        <a:srgbClr val="FFFFFF">
-                          <a:alpha val="0"/>
-                        </a:srgbClr>
-                      </a:solidFill>
+                    <a:lnT algn="ctr" cmpd="sng" cap="flat" w="0">
+                      <a:noFill/>
                       <a:prstDash val="solid"/>
                     </a:lnT>
-                    <a:lnB w="0" cmpd="sng" algn="ctr" cap="flat">
-                      <a:solidFill>
-                        <a:srgbClr val="FFFFFF">
-                          <a:alpha val="0"/>
-                        </a:srgbClr>
-                      </a:solidFill>
+                    <a:lnB algn="ctr" cmpd="sng" cap="flat" w="0">
+                      <a:noFill/>
                       <a:prstDash val="solid"/>
                     </a:lnB>
+                    <a:solidFill>
+                      <a:srgbClr val="FFFFFF">
+                        <a:alpha val="0"/>
+                      </a:srgbClr>
+                    </a:solidFill>
                   </a:tcPr>
                 </a:tc>
                 <a:tc>
@@ -3602,60 +3470,51 @@
                           <a:spcPct val="100000"/>
                         </a:lnSpc>
                         <a:spcBef>
-                          <a:spcPts val="200"/>
+                          <a:spcPts val="500"/>
                         </a:spcBef>
                         <a:spcAft>
-                          <a:spcPts val="200"/>
+                          <a:spcPts val="500"/>
                         </a:spcAft>
                         <a:buNone/>
                       </a:pPr>
                       <a:r>
-                        <a:rPr sz="1100">
+                        <a:rPr cap="none" sz="1100" i="0" b="0" u="none">
                           <a:solidFill>
-                            <a:srgbClr val="111111">
+                            <a:srgbClr val="000000">
                               <a:alpha val="100000"/>
                             </a:srgbClr>
                           </a:solidFill>
-                          <a:latin typeface="Roboto"/>
-                          <a:cs typeface="Roboto"/>
+                          <a:latin typeface="Helvetica"/>
+                          <a:cs typeface="Helvetica"/>
+                          <a:ea typeface="Helvetica"/>
+                          <a:sym typeface="Helvetica"/>
                         </a:rPr>
-                        <a:t>5.0%</a:t>
+                        <a:t>8.7%</a:t>
                       </a:r>
                     </a:p>
                   </a:txBody>
-                  <a:tcPr anchor="ctr" marB="0" marT="0" marR="0" marL="0">
-                    <a:lnL w="0" cmpd="sng" algn="ctr" cap="flat">
-                      <a:solidFill>
-                        <a:srgbClr val="FFFFFF">
-                          <a:alpha val="0"/>
-                        </a:srgbClr>
-                      </a:solidFill>
+                  <a:tcPr anchor="ctr" marB="63500" marT="63500" marR="0" marL="0">
+                    <a:lnL algn="ctr" cmpd="sng" cap="flat" w="0">
+                      <a:noFill/>
                       <a:prstDash val="solid"/>
                     </a:lnL>
-                    <a:lnR w="0" cmpd="sng" algn="ctr" cap="flat">
-                      <a:solidFill>
-                        <a:srgbClr val="FFFFFF">
-                          <a:alpha val="0"/>
-                        </a:srgbClr>
-                      </a:solidFill>
+                    <a:lnR algn="ctr" cmpd="sng" cap="flat" w="0">
+                      <a:noFill/>
                       <a:prstDash val="solid"/>
                     </a:lnR>
-                    <a:lnT w="0" cmpd="sng" algn="ctr" cap="flat">
-                      <a:solidFill>
-                        <a:srgbClr val="FFFFFF">
-                          <a:alpha val="0"/>
-                        </a:srgbClr>
-                      </a:solidFill>
+                    <a:lnT algn="ctr" cmpd="sng" cap="flat" w="0">
+                      <a:noFill/>
                       <a:prstDash val="solid"/>
                     </a:lnT>
-                    <a:lnB w="0" cmpd="sng" algn="ctr" cap="flat">
-                      <a:solidFill>
-                        <a:srgbClr val="FFFFFF">
-                          <a:alpha val="0"/>
-                        </a:srgbClr>
-                      </a:solidFill>
+                    <a:lnB algn="ctr" cmpd="sng" cap="flat" w="0">
+                      <a:noFill/>
                       <a:prstDash val="solid"/>
                     </a:lnB>
+                    <a:solidFill>
+                      <a:srgbClr val="FFFFFF">
+                        <a:alpha val="0"/>
+                      </a:srgbClr>
+                    </a:solidFill>
                   </a:tcPr>
                 </a:tc>
                 <a:tc>
@@ -3668,60 +3527,51 @@
                           <a:spcPct val="100000"/>
                         </a:lnSpc>
                         <a:spcBef>
-                          <a:spcPts val="200"/>
+                          <a:spcPts val="500"/>
                         </a:spcBef>
                         <a:spcAft>
-                          <a:spcPts val="200"/>
+                          <a:spcPts val="500"/>
                         </a:spcAft>
                         <a:buNone/>
                       </a:pPr>
                       <a:r>
-                        <a:rPr sz="1100">
+                        <a:rPr cap="none" sz="1100" i="0" b="0" u="none">
                           <a:solidFill>
-                            <a:srgbClr val="111111">
+                            <a:srgbClr val="000000">
                               <a:alpha val="100000"/>
                             </a:srgbClr>
                           </a:solidFill>
-                          <a:latin typeface="Roboto"/>
-                          <a:cs typeface="Roboto"/>
+                          <a:latin typeface="Helvetica"/>
+                          <a:cs typeface="Helvetica"/>
+                          <a:ea typeface="Helvetica"/>
+                          <a:sym typeface="Helvetica"/>
                         </a:rPr>
-                        <a:t>28.8%</a:t>
+                        <a:t>49.90%</a:t>
                       </a:r>
                     </a:p>
                   </a:txBody>
-                  <a:tcPr anchor="ctr" marB="0" marT="0" marR="0" marL="0">
-                    <a:lnL w="0" cmpd="sng" algn="ctr" cap="flat">
-                      <a:solidFill>
-                        <a:srgbClr val="FFFFFF">
-                          <a:alpha val="0"/>
-                        </a:srgbClr>
-                      </a:solidFill>
+                  <a:tcPr anchor="ctr" marB="63500" marT="63500" marR="0" marL="0">
+                    <a:lnL algn="ctr" cmpd="sng" cap="flat" w="0">
+                      <a:noFill/>
                       <a:prstDash val="solid"/>
                     </a:lnL>
-                    <a:lnR w="0" cmpd="sng" algn="ctr" cap="flat">
-                      <a:solidFill>
-                        <a:srgbClr val="FFFFFF">
-                          <a:alpha val="0"/>
-                        </a:srgbClr>
-                      </a:solidFill>
+                    <a:lnR algn="ctr" cmpd="sng" cap="flat" w="0">
+                      <a:noFill/>
                       <a:prstDash val="solid"/>
                     </a:lnR>
-                    <a:lnT w="0" cmpd="sng" algn="ctr" cap="flat">
-                      <a:solidFill>
-                        <a:srgbClr val="FFFFFF">
-                          <a:alpha val="0"/>
-                        </a:srgbClr>
-                      </a:solidFill>
+                    <a:lnT algn="ctr" cmpd="sng" cap="flat" w="0">
+                      <a:noFill/>
                       <a:prstDash val="solid"/>
                     </a:lnT>
-                    <a:lnB w="0" cmpd="sng" algn="ctr" cap="flat">
-                      <a:solidFill>
-                        <a:srgbClr val="FFFFFF">
-                          <a:alpha val="0"/>
-                        </a:srgbClr>
-                      </a:solidFill>
+                    <a:lnB algn="ctr" cmpd="sng" cap="flat" w="0">
+                      <a:noFill/>
                       <a:prstDash val="solid"/>
                     </a:lnB>
+                    <a:solidFill>
+                      <a:srgbClr val="FFFFFF">
+                        <a:alpha val="0"/>
+                      </a:srgbClr>
+                    </a:solidFill>
                   </a:tcPr>
                 </a:tc>
                 <a:tc>
@@ -3734,60 +3584,51 @@
                           <a:spcPct val="100000"/>
                         </a:lnSpc>
                         <a:spcBef>
-                          <a:spcPts val="200"/>
+                          <a:spcPts val="500"/>
                         </a:spcBef>
                         <a:spcAft>
-                          <a:spcPts val="200"/>
+                          <a:spcPts val="500"/>
                         </a:spcAft>
                         <a:buNone/>
                       </a:pPr>
                       <a:r>
-                        <a:rPr sz="1100">
+                        <a:rPr cap="none" sz="1100" i="0" b="0" u="none">
                           <a:solidFill>
-                            <a:srgbClr val="111111">
+                            <a:srgbClr val="000000">
                               <a:alpha val="100000"/>
                             </a:srgbClr>
                           </a:solidFill>
-                          <a:latin typeface="Roboto"/>
-                          <a:cs typeface="Roboto"/>
+                          <a:latin typeface="Helvetica"/>
+                          <a:cs typeface="Helvetica"/>
+                          <a:ea typeface="Helvetica"/>
+                          <a:sym typeface="Helvetica"/>
                         </a:rPr>
-                        <a:t>34%</a:t>
+                        <a:t>54%</a:t>
                       </a:r>
                     </a:p>
                   </a:txBody>
-                  <a:tcPr anchor="ctr" marB="0" marT="0" marR="0" marL="0">
-                    <a:lnL w="0" cmpd="sng" algn="ctr" cap="flat">
-                      <a:solidFill>
-                        <a:srgbClr val="FFFFFF">
-                          <a:alpha val="0"/>
-                        </a:srgbClr>
-                      </a:solidFill>
+                  <a:tcPr anchor="ctr" marB="63500" marT="63500" marR="0" marL="0">
+                    <a:lnL algn="ctr" cmpd="sng" cap="flat" w="0">
+                      <a:noFill/>
                       <a:prstDash val="solid"/>
                     </a:lnL>
-                    <a:lnR w="0" cmpd="sng" algn="ctr" cap="flat">
-                      <a:solidFill>
-                        <a:srgbClr val="FFFFFF">
-                          <a:alpha val="0"/>
-                        </a:srgbClr>
-                      </a:solidFill>
+                    <a:lnR algn="ctr" cmpd="sng" cap="flat" w="0">
+                      <a:noFill/>
                       <a:prstDash val="solid"/>
                     </a:lnR>
-                    <a:lnT w="0" cmpd="sng" algn="ctr" cap="flat">
-                      <a:solidFill>
-                        <a:srgbClr val="FFFFFF">
-                          <a:alpha val="0"/>
-                        </a:srgbClr>
-                      </a:solidFill>
+                    <a:lnT algn="ctr" cmpd="sng" cap="flat" w="0">
+                      <a:noFill/>
                       <a:prstDash val="solid"/>
                     </a:lnT>
-                    <a:lnB w="0" cmpd="sng" algn="ctr" cap="flat">
-                      <a:solidFill>
-                        <a:srgbClr val="FFFFFF">
-                          <a:alpha val="0"/>
-                        </a:srgbClr>
-                      </a:solidFill>
+                    <a:lnB algn="ctr" cmpd="sng" cap="flat" w="0">
+                      <a:noFill/>
                       <a:prstDash val="solid"/>
                     </a:lnB>
+                    <a:solidFill>
+                      <a:srgbClr val="FFFFFF">
+                        <a:alpha val="0"/>
+                      </a:srgbClr>
+                    </a:solidFill>
                   </a:tcPr>
                 </a:tc>
                 <a:tc>
@@ -3800,60 +3641,51 @@
                           <a:spcPct val="100000"/>
                         </a:lnSpc>
                         <a:spcBef>
-                          <a:spcPts val="200"/>
+                          <a:spcPts val="500"/>
                         </a:spcBef>
                         <a:spcAft>
-                          <a:spcPts val="200"/>
+                          <a:spcPts val="500"/>
                         </a:spcAft>
                         <a:buNone/>
                       </a:pPr>
                       <a:r>
-                        <a:rPr sz="1100">
+                        <a:rPr cap="none" sz="1100" i="0" b="0" u="none">
                           <a:solidFill>
-                            <a:srgbClr val="111111">
+                            <a:srgbClr val="000000">
                               <a:alpha val="100000"/>
                             </a:srgbClr>
                           </a:solidFill>
-                          <a:latin typeface="Roboto"/>
-                          <a:cs typeface="Roboto"/>
+                          <a:latin typeface="Helvetica"/>
+                          <a:cs typeface="Helvetica"/>
+                          <a:ea typeface="Helvetica"/>
+                          <a:sym typeface="Helvetica"/>
                         </a:rPr>
-                        <a:t>57%</a:t>
+                        <a:t>93%</a:t>
                       </a:r>
                     </a:p>
                   </a:txBody>
-                  <a:tcPr anchor="ctr" marB="0" marT="0" marR="0" marL="0">
-                    <a:lnL w="0" cmpd="sng" algn="ctr" cap="flat">
-                      <a:solidFill>
-                        <a:srgbClr val="FFFFFF">
-                          <a:alpha val="0"/>
-                        </a:srgbClr>
-                      </a:solidFill>
+                  <a:tcPr anchor="ctr" marB="63500" marT="63500" marR="0" marL="0">
+                    <a:lnL algn="ctr" cmpd="sng" cap="flat" w="0">
+                      <a:noFill/>
                       <a:prstDash val="solid"/>
                     </a:lnL>
-                    <a:lnR w="0" cmpd="sng" algn="ctr" cap="flat">
-                      <a:solidFill>
-                        <a:srgbClr val="FFFFFF">
-                          <a:alpha val="0"/>
-                        </a:srgbClr>
-                      </a:solidFill>
+                    <a:lnR algn="ctr" cmpd="sng" cap="flat" w="0">
+                      <a:noFill/>
                       <a:prstDash val="solid"/>
                     </a:lnR>
-                    <a:lnT w="0" cmpd="sng" algn="ctr" cap="flat">
-                      <a:solidFill>
-                        <a:srgbClr val="FFFFFF">
-                          <a:alpha val="0"/>
-                        </a:srgbClr>
-                      </a:solidFill>
+                    <a:lnT algn="ctr" cmpd="sng" cap="flat" w="0">
+                      <a:noFill/>
                       <a:prstDash val="solid"/>
                     </a:lnT>
-                    <a:lnB w="0" cmpd="sng" algn="ctr" cap="flat">
-                      <a:solidFill>
-                        <a:srgbClr val="FFFFFF">
-                          <a:alpha val="0"/>
-                        </a:srgbClr>
-                      </a:solidFill>
+                    <a:lnB algn="ctr" cmpd="sng" cap="flat" w="0">
+                      <a:noFill/>
                       <a:prstDash val="solid"/>
                     </a:lnB>
+                    <a:solidFill>
+                      <a:srgbClr val="FFFFFF">
+                        <a:alpha val="0"/>
+                      </a:srgbClr>
+                    </a:solidFill>
                   </a:tcPr>
                 </a:tc>
               </a:tr>
@@ -3868,60 +3700,55 @@
                           <a:spcPct val="100000"/>
                         </a:lnSpc>
                         <a:spcBef>
-                          <a:spcPts val="200"/>
+                          <a:spcPts val="500"/>
                         </a:spcBef>
                         <a:spcAft>
-                          <a:spcPts val="200"/>
+                          <a:spcPts val="500"/>
                         </a:spcAft>
                         <a:buNone/>
                       </a:pPr>
                       <a:r>
-                        <a:rPr sz="1100">
+                        <a:rPr cap="none" sz="1100" i="0" b="0" u="none">
                           <a:solidFill>
-                            <a:srgbClr val="111111">
+                            <a:srgbClr val="000000">
                               <a:alpha val="100000"/>
                             </a:srgbClr>
                           </a:solidFill>
-                          <a:latin typeface="Roboto"/>
-                          <a:cs typeface="Roboto"/>
+                          <a:latin typeface="Helvetica"/>
+                          <a:cs typeface="Helvetica"/>
+                          <a:ea typeface="Helvetica"/>
+                          <a:sym typeface="Helvetica"/>
                         </a:rPr>
                         <a:t>NVDA</a:t>
                       </a:r>
                     </a:p>
                   </a:txBody>
-                  <a:tcPr anchor="ctr" marB="0" marT="0" marR="0" marL="0">
-                    <a:lnL w="0" cmpd="sng" algn="ctr" cap="flat">
+                  <a:tcPr anchor="ctr" marB="63500" marT="63500" marR="0" marL="0">
+                    <a:lnL algn="ctr" cmpd="sng" cap="flat" w="0">
+                      <a:noFill/>
+                      <a:prstDash val="solid"/>
+                    </a:lnL>
+                    <a:lnR algn="ctr" cmpd="sng" cap="flat" w="0">
+                      <a:noFill/>
+                      <a:prstDash val="solid"/>
+                    </a:lnR>
+                    <a:lnT algn="ctr" cmpd="sng" cap="flat" w="0">
+                      <a:noFill/>
+                      <a:prstDash val="solid"/>
+                    </a:lnT>
+                    <a:lnB algn="ctr" cmpd="sng" cap="flat" w="19050">
                       <a:solidFill>
-                        <a:srgbClr val="FFFFFF">
-                          <a:alpha val="0"/>
-                        </a:srgbClr>
-                      </a:solidFill>
-                      <a:prstDash val="solid"/>
-                    </a:lnL>
-                    <a:lnR w="0" cmpd="sng" algn="ctr" cap="flat">
-                      <a:solidFill>
-                        <a:srgbClr val="FFFFFF">
-                          <a:alpha val="0"/>
-                        </a:srgbClr>
-                      </a:solidFill>
-                      <a:prstDash val="solid"/>
-                    </a:lnR>
-                    <a:lnT w="0" cmpd="sng" algn="ctr" cap="flat">
-                      <a:solidFill>
-                        <a:srgbClr val="FFFFFF">
-                          <a:alpha val="0"/>
-                        </a:srgbClr>
-                      </a:solidFill>
-                      <a:prstDash val="solid"/>
-                    </a:lnT>
-                    <a:lnB w="25400" cmpd="sng" algn="ctr" cap="flat">
-                      <a:solidFill>
-                        <a:srgbClr val="000000">
+                        <a:srgbClr val="666666">
                           <a:alpha val="100000"/>
                         </a:srgbClr>
                       </a:solidFill>
                       <a:prstDash val="solid"/>
                     </a:lnB>
+                    <a:solidFill>
+                      <a:srgbClr val="FFFFFF">
+                        <a:alpha val="0"/>
+                      </a:srgbClr>
+                    </a:solidFill>
                   </a:tcPr>
                 </a:tc>
                 <a:tc>
@@ -3934,60 +3761,55 @@
                           <a:spcPct val="100000"/>
                         </a:lnSpc>
                         <a:spcBef>
-                          <a:spcPts val="200"/>
+                          <a:spcPts val="500"/>
                         </a:spcBef>
                         <a:spcAft>
-                          <a:spcPts val="200"/>
+                          <a:spcPts val="500"/>
                         </a:spcAft>
                         <a:buNone/>
                       </a:pPr>
                       <a:r>
-                        <a:rPr sz="1100">
+                        <a:rPr cap="none" sz="1100" i="0" b="0" u="none">
                           <a:solidFill>
-                            <a:srgbClr val="111111">
+                            <a:srgbClr val="000000">
                               <a:alpha val="100000"/>
                             </a:srgbClr>
                           </a:solidFill>
-                          <a:latin typeface="Roboto"/>
-                          <a:cs typeface="Roboto"/>
+                          <a:latin typeface="Helvetica"/>
+                          <a:cs typeface="Helvetica"/>
+                          <a:ea typeface="Helvetica"/>
+                          <a:sym typeface="Helvetica"/>
                         </a:rPr>
-                        <a:t>8.29%</a:t>
+                        <a:t>2.02%</a:t>
                       </a:r>
                     </a:p>
                   </a:txBody>
-                  <a:tcPr anchor="ctr" marB="0" marT="0" marR="0" marL="0">
-                    <a:lnL w="0" cmpd="sng" algn="ctr" cap="flat">
+                  <a:tcPr anchor="ctr" marB="63500" marT="63500" marR="0" marL="0">
+                    <a:lnL algn="ctr" cmpd="sng" cap="flat" w="0">
+                      <a:noFill/>
+                      <a:prstDash val="solid"/>
+                    </a:lnL>
+                    <a:lnR algn="ctr" cmpd="sng" cap="flat" w="0">
+                      <a:noFill/>
+                      <a:prstDash val="solid"/>
+                    </a:lnR>
+                    <a:lnT algn="ctr" cmpd="sng" cap="flat" w="0">
+                      <a:noFill/>
+                      <a:prstDash val="solid"/>
+                    </a:lnT>
+                    <a:lnB algn="ctr" cmpd="sng" cap="flat" w="19050">
                       <a:solidFill>
-                        <a:srgbClr val="FFFFFF">
-                          <a:alpha val="0"/>
-                        </a:srgbClr>
-                      </a:solidFill>
-                      <a:prstDash val="solid"/>
-                    </a:lnL>
-                    <a:lnR w="0" cmpd="sng" algn="ctr" cap="flat">
-                      <a:solidFill>
-                        <a:srgbClr val="FFFFFF">
-                          <a:alpha val="0"/>
-                        </a:srgbClr>
-                      </a:solidFill>
-                      <a:prstDash val="solid"/>
-                    </a:lnR>
-                    <a:lnT w="0" cmpd="sng" algn="ctr" cap="flat">
-                      <a:solidFill>
-                        <a:srgbClr val="FFFFFF">
-                          <a:alpha val="0"/>
-                        </a:srgbClr>
-                      </a:solidFill>
-                      <a:prstDash val="solid"/>
-                    </a:lnT>
-                    <a:lnB w="25400" cmpd="sng" algn="ctr" cap="flat">
-                      <a:solidFill>
-                        <a:srgbClr val="000000">
+                        <a:srgbClr val="666666">
                           <a:alpha val="100000"/>
                         </a:srgbClr>
                       </a:solidFill>
                       <a:prstDash val="solid"/>
                     </a:lnB>
+                    <a:solidFill>
+                      <a:srgbClr val="FFFFFF">
+                        <a:alpha val="0"/>
+                      </a:srgbClr>
+                    </a:solidFill>
                   </a:tcPr>
                 </a:tc>
                 <a:tc>
@@ -4000,60 +3822,55 @@
                           <a:spcPct val="100000"/>
                         </a:lnSpc>
                         <a:spcBef>
-                          <a:spcPts val="200"/>
+                          <a:spcPts val="500"/>
                         </a:spcBef>
                         <a:spcAft>
-                          <a:spcPts val="200"/>
+                          <a:spcPts val="500"/>
                         </a:spcAft>
                         <a:buNone/>
                       </a:pPr>
                       <a:r>
-                        <a:rPr sz="1100">
+                        <a:rPr cap="none" sz="1100" i="0" b="0" u="none">
                           <a:solidFill>
-                            <a:srgbClr val="111111">
+                            <a:srgbClr val="000000">
                               <a:alpha val="100000"/>
                             </a:srgbClr>
                           </a:solidFill>
-                          <a:latin typeface="Roboto"/>
-                          <a:cs typeface="Roboto"/>
+                          <a:latin typeface="Helvetica"/>
+                          <a:cs typeface="Helvetica"/>
+                          <a:ea typeface="Helvetica"/>
+                          <a:sym typeface="Helvetica"/>
                         </a:rPr>
-                        <a:t>25.1%</a:t>
+                        <a:t>17.5%</a:t>
                       </a:r>
                     </a:p>
                   </a:txBody>
-                  <a:tcPr anchor="ctr" marB="0" marT="0" marR="0" marL="0">
-                    <a:lnL w="0" cmpd="sng" algn="ctr" cap="flat">
+                  <a:tcPr anchor="ctr" marB="63500" marT="63500" marR="0" marL="0">
+                    <a:lnL algn="ctr" cmpd="sng" cap="flat" w="0">
+                      <a:noFill/>
+                      <a:prstDash val="solid"/>
+                    </a:lnL>
+                    <a:lnR algn="ctr" cmpd="sng" cap="flat" w="0">
+                      <a:noFill/>
+                      <a:prstDash val="solid"/>
+                    </a:lnR>
+                    <a:lnT algn="ctr" cmpd="sng" cap="flat" w="0">
+                      <a:noFill/>
+                      <a:prstDash val="solid"/>
+                    </a:lnT>
+                    <a:lnB algn="ctr" cmpd="sng" cap="flat" w="19050">
                       <a:solidFill>
-                        <a:srgbClr val="FFFFFF">
-                          <a:alpha val="0"/>
-                        </a:srgbClr>
-                      </a:solidFill>
-                      <a:prstDash val="solid"/>
-                    </a:lnL>
-                    <a:lnR w="0" cmpd="sng" algn="ctr" cap="flat">
-                      <a:solidFill>
-                        <a:srgbClr val="FFFFFF">
-                          <a:alpha val="0"/>
-                        </a:srgbClr>
-                      </a:solidFill>
-                      <a:prstDash val="solid"/>
-                    </a:lnR>
-                    <a:lnT w="0" cmpd="sng" algn="ctr" cap="flat">
-                      <a:solidFill>
-                        <a:srgbClr val="FFFFFF">
-                          <a:alpha val="0"/>
-                        </a:srgbClr>
-                      </a:solidFill>
-                      <a:prstDash val="solid"/>
-                    </a:lnT>
-                    <a:lnB w="25400" cmpd="sng" algn="ctr" cap="flat">
-                      <a:solidFill>
-                        <a:srgbClr val="000000">
+                        <a:srgbClr val="666666">
                           <a:alpha val="100000"/>
                         </a:srgbClr>
                       </a:solidFill>
                       <a:prstDash val="solid"/>
                     </a:lnB>
+                    <a:solidFill>
+                      <a:srgbClr val="FFFFFF">
+                        <a:alpha val="0"/>
+                      </a:srgbClr>
+                    </a:solidFill>
                   </a:tcPr>
                 </a:tc>
                 <a:tc>
@@ -4066,60 +3883,55 @@
                           <a:spcPct val="100000"/>
                         </a:lnSpc>
                         <a:spcBef>
-                          <a:spcPts val="200"/>
+                          <a:spcPts val="500"/>
                         </a:spcBef>
                         <a:spcAft>
-                          <a:spcPts val="200"/>
+                          <a:spcPts val="500"/>
                         </a:spcAft>
                         <a:buNone/>
                       </a:pPr>
                       <a:r>
-                        <a:rPr sz="1100">
+                        <a:rPr cap="none" sz="1100" i="0" b="0" u="none">
                           <a:solidFill>
-                            <a:srgbClr val="111111">
+                            <a:srgbClr val="000000">
                               <a:alpha val="100000"/>
                             </a:srgbClr>
                           </a:solidFill>
-                          <a:latin typeface="Roboto"/>
-                          <a:cs typeface="Roboto"/>
+                          <a:latin typeface="Helvetica"/>
+                          <a:cs typeface="Helvetica"/>
+                          <a:ea typeface="Helvetica"/>
+                          <a:sym typeface="Helvetica"/>
                         </a:rPr>
-                        <a:t>85.3%</a:t>
+                        <a:t>73.35%</a:t>
                       </a:r>
                     </a:p>
                   </a:txBody>
-                  <a:tcPr anchor="ctr" marB="0" marT="0" marR="0" marL="0">
-                    <a:lnL w="0" cmpd="sng" algn="ctr" cap="flat">
+                  <a:tcPr anchor="ctr" marB="63500" marT="63500" marR="0" marL="0">
+                    <a:lnL algn="ctr" cmpd="sng" cap="flat" w="0">
+                      <a:noFill/>
+                      <a:prstDash val="solid"/>
+                    </a:lnL>
+                    <a:lnR algn="ctr" cmpd="sng" cap="flat" w="0">
+                      <a:noFill/>
+                      <a:prstDash val="solid"/>
+                    </a:lnR>
+                    <a:lnT algn="ctr" cmpd="sng" cap="flat" w="0">
+                      <a:noFill/>
+                      <a:prstDash val="solid"/>
+                    </a:lnT>
+                    <a:lnB algn="ctr" cmpd="sng" cap="flat" w="19050">
                       <a:solidFill>
-                        <a:srgbClr val="FFFFFF">
-                          <a:alpha val="0"/>
-                        </a:srgbClr>
-                      </a:solidFill>
-                      <a:prstDash val="solid"/>
-                    </a:lnL>
-                    <a:lnR w="0" cmpd="sng" algn="ctr" cap="flat">
-                      <a:solidFill>
-                        <a:srgbClr val="FFFFFF">
-                          <a:alpha val="0"/>
-                        </a:srgbClr>
-                      </a:solidFill>
-                      <a:prstDash val="solid"/>
-                    </a:lnR>
-                    <a:lnT w="0" cmpd="sng" algn="ctr" cap="flat">
-                      <a:solidFill>
-                        <a:srgbClr val="FFFFFF">
-                          <a:alpha val="0"/>
-                        </a:srgbClr>
-                      </a:solidFill>
-                      <a:prstDash val="solid"/>
-                    </a:lnT>
-                    <a:lnB w="25400" cmpd="sng" algn="ctr" cap="flat">
-                      <a:solidFill>
-                        <a:srgbClr val="000000">
+                        <a:srgbClr val="666666">
                           <a:alpha val="100000"/>
                         </a:srgbClr>
                       </a:solidFill>
                       <a:prstDash val="solid"/>
                     </a:lnB>
+                    <a:solidFill>
+                      <a:srgbClr val="FFFFFF">
+                        <a:alpha val="0"/>
+                      </a:srgbClr>
+                    </a:solidFill>
                   </a:tcPr>
                 </a:tc>
                 <a:tc>
@@ -4132,60 +3944,55 @@
                           <a:spcPct val="100000"/>
                         </a:lnSpc>
                         <a:spcBef>
-                          <a:spcPts val="200"/>
+                          <a:spcPts val="500"/>
                         </a:spcBef>
                         <a:spcAft>
-                          <a:spcPts val="200"/>
+                          <a:spcPts val="500"/>
                         </a:spcAft>
                         <a:buNone/>
                       </a:pPr>
                       <a:r>
-                        <a:rPr sz="1100">
+                        <a:rPr cap="none" sz="1100" i="0" b="0" u="none">
                           <a:solidFill>
-                            <a:srgbClr val="111111">
+                            <a:srgbClr val="000000">
                               <a:alpha val="100000"/>
                             </a:srgbClr>
                           </a:solidFill>
-                          <a:latin typeface="Roboto"/>
-                          <a:cs typeface="Roboto"/>
+                          <a:latin typeface="Helvetica"/>
+                          <a:cs typeface="Helvetica"/>
+                          <a:ea typeface="Helvetica"/>
+                          <a:sym typeface="Helvetica"/>
                         </a:rPr>
-                        <a:t>187%</a:t>
+                        <a:t>211%</a:t>
                       </a:r>
                     </a:p>
                   </a:txBody>
-                  <a:tcPr anchor="ctr" marB="0" marT="0" marR="0" marL="0">
-                    <a:lnL w="0" cmpd="sng" algn="ctr" cap="flat">
+                  <a:tcPr anchor="ctr" marB="63500" marT="63500" marR="0" marL="0">
+                    <a:lnL algn="ctr" cmpd="sng" cap="flat" w="0">
+                      <a:noFill/>
+                      <a:prstDash val="solid"/>
+                    </a:lnL>
+                    <a:lnR algn="ctr" cmpd="sng" cap="flat" w="0">
+                      <a:noFill/>
+                      <a:prstDash val="solid"/>
+                    </a:lnR>
+                    <a:lnT algn="ctr" cmpd="sng" cap="flat" w="0">
+                      <a:noFill/>
+                      <a:prstDash val="solid"/>
+                    </a:lnT>
+                    <a:lnB algn="ctr" cmpd="sng" cap="flat" w="19050">
                       <a:solidFill>
-                        <a:srgbClr val="FFFFFF">
-                          <a:alpha val="0"/>
-                        </a:srgbClr>
-                      </a:solidFill>
-                      <a:prstDash val="solid"/>
-                    </a:lnL>
-                    <a:lnR w="0" cmpd="sng" algn="ctr" cap="flat">
-                      <a:solidFill>
-                        <a:srgbClr val="FFFFFF">
-                          <a:alpha val="0"/>
-                        </a:srgbClr>
-                      </a:solidFill>
-                      <a:prstDash val="solid"/>
-                    </a:lnR>
-                    <a:lnT w="0" cmpd="sng" algn="ctr" cap="flat">
-                      <a:solidFill>
-                        <a:srgbClr val="FFFFFF">
-                          <a:alpha val="0"/>
-                        </a:srgbClr>
-                      </a:solidFill>
-                      <a:prstDash val="solid"/>
-                    </a:lnT>
-                    <a:lnB w="25400" cmpd="sng" algn="ctr" cap="flat">
-                      <a:solidFill>
-                        <a:srgbClr val="000000">
+                        <a:srgbClr val="666666">
                           <a:alpha val="100000"/>
                         </a:srgbClr>
                       </a:solidFill>
                       <a:prstDash val="solid"/>
                     </a:lnB>
+                    <a:solidFill>
+                      <a:srgbClr val="FFFFFF">
+                        <a:alpha val="0"/>
+                      </a:srgbClr>
+                    </a:solidFill>
                   </a:tcPr>
                 </a:tc>
                 <a:tc>
@@ -4198,60 +4005,55 @@
                           <a:spcPct val="100000"/>
                         </a:lnSpc>
                         <a:spcBef>
-                          <a:spcPts val="200"/>
+                          <a:spcPts val="500"/>
                         </a:spcBef>
                         <a:spcAft>
-                          <a:spcPts val="200"/>
+                          <a:spcPts val="500"/>
                         </a:spcAft>
                         <a:buNone/>
                       </a:pPr>
                       <a:r>
-                        <a:rPr sz="1100">
+                        <a:rPr cap="none" sz="1100" i="0" b="0" u="none">
                           <a:solidFill>
-                            <a:srgbClr val="111111">
+                            <a:srgbClr val="000000">
                               <a:alpha val="100000"/>
                             </a:srgbClr>
                           </a:solidFill>
-                          <a:latin typeface="Roboto"/>
-                          <a:cs typeface="Roboto"/>
+                          <a:latin typeface="Helvetica"/>
+                          <a:cs typeface="Helvetica"/>
+                          <a:ea typeface="Helvetica"/>
+                          <a:sym typeface="Helvetica"/>
                         </a:rPr>
-                        <a:t>288%</a:t>
+                        <a:t>241%</a:t>
                       </a:r>
                     </a:p>
                   </a:txBody>
-                  <a:tcPr anchor="ctr" marB="0" marT="0" marR="0" marL="0">
-                    <a:lnL w="0" cmpd="sng" algn="ctr" cap="flat">
+                  <a:tcPr anchor="ctr" marB="63500" marT="63500" marR="0" marL="0">
+                    <a:lnL algn="ctr" cmpd="sng" cap="flat" w="0">
+                      <a:noFill/>
+                      <a:prstDash val="solid"/>
+                    </a:lnL>
+                    <a:lnR algn="ctr" cmpd="sng" cap="flat" w="0">
+                      <a:noFill/>
+                      <a:prstDash val="solid"/>
+                    </a:lnR>
+                    <a:lnT algn="ctr" cmpd="sng" cap="flat" w="0">
+                      <a:noFill/>
+                      <a:prstDash val="solid"/>
+                    </a:lnT>
+                    <a:lnB algn="ctr" cmpd="sng" cap="flat" w="19050">
                       <a:solidFill>
-                        <a:srgbClr val="FFFFFF">
-                          <a:alpha val="0"/>
-                        </a:srgbClr>
-                      </a:solidFill>
-                      <a:prstDash val="solid"/>
-                    </a:lnL>
-                    <a:lnR w="0" cmpd="sng" algn="ctr" cap="flat">
-                      <a:solidFill>
-                        <a:srgbClr val="FFFFFF">
-                          <a:alpha val="0"/>
-                        </a:srgbClr>
-                      </a:solidFill>
-                      <a:prstDash val="solid"/>
-                    </a:lnR>
-                    <a:lnT w="0" cmpd="sng" algn="ctr" cap="flat">
-                      <a:solidFill>
-                        <a:srgbClr val="FFFFFF">
-                          <a:alpha val="0"/>
-                        </a:srgbClr>
-                      </a:solidFill>
-                      <a:prstDash val="solid"/>
-                    </a:lnT>
-                    <a:lnB w="25400" cmpd="sng" algn="ctr" cap="flat">
-                      <a:solidFill>
-                        <a:srgbClr val="000000">
+                        <a:srgbClr val="666666">
                           <a:alpha val="100000"/>
                         </a:srgbClr>
                       </a:solidFill>
                       <a:prstDash val="solid"/>
                     </a:lnB>
+                    <a:solidFill>
+                      <a:srgbClr val="FFFFFF">
+                        <a:alpha val="0"/>
+                      </a:srgbClr>
+                    </a:solidFill>
                   </a:tcPr>
                 </a:tc>
               </a:tr>
@@ -4259,9 +4061,9 @@
           </a:graphicData>
         </a:graphic>
       </p:graphicFrame>
-      <p:pic xmlns:a="http://schemas.openxmlformats.org/drawingml/2006/main" xmlns:r="http://schemas.openxmlformats.org/officeDocument/2006/relationships" xmlns:p="http://schemas.openxmlformats.org/presentationml/2006/main">
+      <p:pic>
         <p:nvPicPr>
-          <p:cNvPr id="4" name="Content Placeholder 3"/>
+          <p:cNvPr id="4" name="Content Placeholder 3" descr=""/>
           <p:cNvPicPr>
             <a:picLocks noGrp="1"/>
           </p:cNvPicPr>

</xml_diff>